<commit_message>
New telosys-doc GitHub icon
</commit_message>
<xml_diff>
--- a/icons/icons-for-github/v3/Telosys-v3-GitHub-Icones.pptx
+++ b/icons/icons-for-github/v3/Telosys-v3-GitHub-Icones.pptx
@@ -8,6 +8,7 @@
     <p:sldId id="256" r:id="rId2"/>
     <p:sldId id="257" r:id="rId3"/>
     <p:sldId id="258" r:id="rId4"/>
+    <p:sldId id="259" r:id="rId5"/>
   </p:sldIdLst>
   <p:sldSz cx="12192000" cy="6858000"/>
   <p:notesSz cx="6858000" cy="9144000"/>
@@ -114,10 +115,6 @@
 </p:presentation>
 </file>
 
-<file path=ppt/revisionInfo.xml><?xml version="1.0" encoding="utf-8"?>
-<p1510:revInfo xmlns:a="http://schemas.openxmlformats.org/drawingml/2006/main" xmlns:r="http://schemas.openxmlformats.org/officeDocument/2006/relationships" xmlns:p1510="http://schemas.microsoft.com/office/powerpoint/2015/10/main"/>
-</file>
-
 <file path=ppt/slideLayouts/slideLayout1.xml><?xml version="1.0" encoding="utf-8"?>
 <p:sldLayout xmlns:a="http://schemas.openxmlformats.org/drawingml/2006/main" xmlns:r="http://schemas.openxmlformats.org/officeDocument/2006/relationships" xmlns:p="http://schemas.openxmlformats.org/presentationml/2006/main" type="title" preserve="1">
   <p:cSld name="Diapositive de titre">
@@ -265,7 +262,7 @@
           <a:p>
             <a:fld id="{FAEABA7C-D0C0-4E4D-9FB6-966D6CEA2D6D}" type="datetimeFigureOut">
               <a:rPr lang="fr-FR" smtClean="0"/>
-              <a:t>16/04/2018</a:t>
+              <a:t>18/12/2019</a:t>
             </a:fld>
             <a:endParaRPr lang="fr-FR"/>
           </a:p>
@@ -463,7 +460,7 @@
           <a:p>
             <a:fld id="{FAEABA7C-D0C0-4E4D-9FB6-966D6CEA2D6D}" type="datetimeFigureOut">
               <a:rPr lang="fr-FR" smtClean="0"/>
-              <a:t>16/04/2018</a:t>
+              <a:t>18/12/2019</a:t>
             </a:fld>
             <a:endParaRPr lang="fr-FR"/>
           </a:p>
@@ -671,7 +668,7 @@
           <a:p>
             <a:fld id="{FAEABA7C-D0C0-4E4D-9FB6-966D6CEA2D6D}" type="datetimeFigureOut">
               <a:rPr lang="fr-FR" smtClean="0"/>
-              <a:t>16/04/2018</a:t>
+              <a:t>18/12/2019</a:t>
             </a:fld>
             <a:endParaRPr lang="fr-FR"/>
           </a:p>
@@ -869,7 +866,7 @@
           <a:p>
             <a:fld id="{FAEABA7C-D0C0-4E4D-9FB6-966D6CEA2D6D}" type="datetimeFigureOut">
               <a:rPr lang="fr-FR" smtClean="0"/>
-              <a:t>16/04/2018</a:t>
+              <a:t>18/12/2019</a:t>
             </a:fld>
             <a:endParaRPr lang="fr-FR"/>
           </a:p>
@@ -1144,7 +1141,7 @@
           <a:p>
             <a:fld id="{FAEABA7C-D0C0-4E4D-9FB6-966D6CEA2D6D}" type="datetimeFigureOut">
               <a:rPr lang="fr-FR" smtClean="0"/>
-              <a:t>16/04/2018</a:t>
+              <a:t>18/12/2019</a:t>
             </a:fld>
             <a:endParaRPr lang="fr-FR"/>
           </a:p>
@@ -1409,7 +1406,7 @@
           <a:p>
             <a:fld id="{FAEABA7C-D0C0-4E4D-9FB6-966D6CEA2D6D}" type="datetimeFigureOut">
               <a:rPr lang="fr-FR" smtClean="0"/>
-              <a:t>16/04/2018</a:t>
+              <a:t>18/12/2019</a:t>
             </a:fld>
             <a:endParaRPr lang="fr-FR"/>
           </a:p>
@@ -1821,7 +1818,7 @@
           <a:p>
             <a:fld id="{FAEABA7C-D0C0-4E4D-9FB6-966D6CEA2D6D}" type="datetimeFigureOut">
               <a:rPr lang="fr-FR" smtClean="0"/>
-              <a:t>16/04/2018</a:t>
+              <a:t>18/12/2019</a:t>
             </a:fld>
             <a:endParaRPr lang="fr-FR"/>
           </a:p>
@@ -1962,7 +1959,7 @@
           <a:p>
             <a:fld id="{FAEABA7C-D0C0-4E4D-9FB6-966D6CEA2D6D}" type="datetimeFigureOut">
               <a:rPr lang="fr-FR" smtClean="0"/>
-              <a:t>16/04/2018</a:t>
+              <a:t>18/12/2019</a:t>
             </a:fld>
             <a:endParaRPr lang="fr-FR"/>
           </a:p>
@@ -2075,7 +2072,7 @@
           <a:p>
             <a:fld id="{FAEABA7C-D0C0-4E4D-9FB6-966D6CEA2D6D}" type="datetimeFigureOut">
               <a:rPr lang="fr-FR" smtClean="0"/>
-              <a:t>16/04/2018</a:t>
+              <a:t>18/12/2019</a:t>
             </a:fld>
             <a:endParaRPr lang="fr-FR"/>
           </a:p>
@@ -2386,7 +2383,7 @@
           <a:p>
             <a:fld id="{FAEABA7C-D0C0-4E4D-9FB6-966D6CEA2D6D}" type="datetimeFigureOut">
               <a:rPr lang="fr-FR" smtClean="0"/>
-              <a:t>16/04/2018</a:t>
+              <a:t>18/12/2019</a:t>
             </a:fld>
             <a:endParaRPr lang="fr-FR"/>
           </a:p>
@@ -2674,7 +2671,7 @@
           <a:p>
             <a:fld id="{FAEABA7C-D0C0-4E4D-9FB6-966D6CEA2D6D}" type="datetimeFigureOut">
               <a:rPr lang="fr-FR" smtClean="0"/>
-              <a:t>16/04/2018</a:t>
+              <a:t>18/12/2019</a:t>
             </a:fld>
             <a:endParaRPr lang="fr-FR"/>
           </a:p>
@@ -2915,7 +2912,7 @@
           <a:p>
             <a:fld id="{FAEABA7C-D0C0-4E4D-9FB6-966D6CEA2D6D}" type="datetimeFigureOut">
               <a:rPr lang="fr-FR" smtClean="0"/>
-              <a:t>16/04/2018</a:t>
+              <a:t>18/12/2019</a:t>
             </a:fld>
             <a:endParaRPr lang="fr-FR"/>
           </a:p>
@@ -4485,6 +4482,444 @@
 </p:sld>
 </file>
 
+<file path=ppt/slides/slide4.xml><?xml version="1.0" encoding="utf-8"?>
+<p:sld xmlns:a="http://schemas.openxmlformats.org/drawingml/2006/main" xmlns:r="http://schemas.openxmlformats.org/officeDocument/2006/relationships" xmlns:p="http://schemas.openxmlformats.org/presentationml/2006/main">
+  <p:cSld>
+    <p:spTree>
+      <p:nvGrpSpPr>
+        <p:cNvPr id="1" name=""/>
+        <p:cNvGrpSpPr/>
+        <p:nvPr/>
+      </p:nvGrpSpPr>
+      <p:grpSpPr>
+        <a:xfrm>
+          <a:off x="0" y="0"/>
+          <a:ext cx="0" cy="0"/>
+          <a:chOff x="0" y="0"/>
+          <a:chExt cx="0" cy="0"/>
+        </a:xfrm>
+      </p:grpSpPr>
+      <p:pic>
+        <p:nvPicPr>
+          <p:cNvPr id="5" name="Image 4">
+            <a:extLst>
+              <a:ext uri="{FF2B5EF4-FFF2-40B4-BE49-F238E27FC236}">
+                <a16:creationId xmlns:a16="http://schemas.microsoft.com/office/drawing/2014/main" id="{C345F049-F309-4CC2-9648-D43C4DD6D690}"/>
+              </a:ext>
+            </a:extLst>
+          </p:cNvPr>
+          <p:cNvPicPr>
+            <a:picLocks noChangeAspect="1"/>
+          </p:cNvPicPr>
+          <p:nvPr/>
+        </p:nvPicPr>
+        <p:blipFill>
+          <a:blip r:embed="rId2">
+            <a:extLst>
+              <a:ext uri="{28A0092B-C50C-407E-A947-70E740481C1C}">
+                <a14:useLocalDpi xmlns:a14="http://schemas.microsoft.com/office/drawing/2010/main" val="0"/>
+              </a:ext>
+            </a:extLst>
+          </a:blip>
+          <a:stretch>
+            <a:fillRect/>
+          </a:stretch>
+        </p:blipFill>
+        <p:spPr>
+          <a:xfrm>
+            <a:off x="1278293" y="757335"/>
+            <a:ext cx="3646714" cy="3646714"/>
+          </a:xfrm>
+          <a:prstGeom prst="rect">
+            <a:avLst/>
+          </a:prstGeom>
+        </p:spPr>
+      </p:pic>
+      <p:sp>
+        <p:nvSpPr>
+          <p:cNvPr id="10" name="ZoneTexte 9">
+            <a:extLst>
+              <a:ext uri="{FF2B5EF4-FFF2-40B4-BE49-F238E27FC236}">
+                <a16:creationId xmlns:a16="http://schemas.microsoft.com/office/drawing/2014/main" id="{5FBCB245-5AFB-4C89-B5F1-758EDEDBE1C2}"/>
+              </a:ext>
+            </a:extLst>
+          </p:cNvPr>
+          <p:cNvSpPr txBox="1"/>
+          <p:nvPr/>
+        </p:nvSpPr>
+        <p:spPr>
+          <a:xfrm>
+            <a:off x="1930580" y="1293787"/>
+            <a:ext cx="1650820" cy="677108"/>
+          </a:xfrm>
+          <a:prstGeom prst="rect">
+            <a:avLst/>
+          </a:prstGeom>
+          <a:noFill/>
+        </p:spPr>
+        <p:txBody>
+          <a:bodyPr wrap="square" lIns="0" tIns="0" rIns="0" bIns="0" rtlCol="0">
+            <a:spAutoFit/>
+          </a:bodyPr>
+          <a:lstStyle/>
+          <a:p>
+            <a:r>
+              <a:rPr lang="en-US" sz="4400" b="1" dirty="0">
+                <a:solidFill>
+                  <a:srgbClr val="C00000"/>
+                </a:solidFill>
+                <a:latin typeface="Tahoma" panose="020B0604030504040204" pitchFamily="34" charset="0"/>
+                <a:ea typeface="Tahoma" panose="020B0604030504040204" pitchFamily="34" charset="0"/>
+                <a:cs typeface="Tahoma" panose="020B0604030504040204" pitchFamily="34" charset="0"/>
+              </a:rPr>
+              <a:t>DOC</a:t>
+            </a:r>
+          </a:p>
+        </p:txBody>
+      </p:sp>
+      <p:pic>
+        <p:nvPicPr>
+          <p:cNvPr id="14" name="Image 13">
+            <a:extLst>
+              <a:ext uri="{FF2B5EF4-FFF2-40B4-BE49-F238E27FC236}">
+                <a16:creationId xmlns:a16="http://schemas.microsoft.com/office/drawing/2014/main" id="{BEBD053C-CFC4-43E0-BAEF-5F4001C471E3}"/>
+              </a:ext>
+            </a:extLst>
+          </p:cNvPr>
+          <p:cNvPicPr>
+            <a:picLocks noChangeAspect="1"/>
+          </p:cNvPicPr>
+          <p:nvPr/>
+        </p:nvPicPr>
+        <p:blipFill>
+          <a:blip r:embed="rId2">
+            <a:extLst>
+              <a:ext uri="{28A0092B-C50C-407E-A947-70E740481C1C}">
+                <a14:useLocalDpi xmlns:a14="http://schemas.microsoft.com/office/drawing/2010/main" val="0"/>
+              </a:ext>
+            </a:extLst>
+          </a:blip>
+          <a:stretch>
+            <a:fillRect/>
+          </a:stretch>
+        </p:blipFill>
+        <p:spPr>
+          <a:xfrm>
+            <a:off x="8545286" y="3063949"/>
+            <a:ext cx="3646714" cy="3646714"/>
+          </a:xfrm>
+          <a:prstGeom prst="rect">
+            <a:avLst/>
+          </a:prstGeom>
+        </p:spPr>
+      </p:pic>
+      <p:pic>
+        <p:nvPicPr>
+          <p:cNvPr id="3" name="Image 2">
+            <a:extLst>
+              <a:ext uri="{FF2B5EF4-FFF2-40B4-BE49-F238E27FC236}">
+                <a16:creationId xmlns:a16="http://schemas.microsoft.com/office/drawing/2014/main" id="{8F6607B8-5C8E-48A5-978A-A6DBF609C021}"/>
+              </a:ext>
+            </a:extLst>
+          </p:cNvPr>
+          <p:cNvPicPr>
+            <a:picLocks noChangeAspect="1"/>
+          </p:cNvPicPr>
+          <p:nvPr/>
+        </p:nvPicPr>
+        <p:blipFill>
+          <a:blip r:embed="rId3">
+            <a:extLst>
+              <a:ext uri="{28A0092B-C50C-407E-A947-70E740481C1C}">
+                <a14:useLocalDpi xmlns:a14="http://schemas.microsoft.com/office/drawing/2010/main" val="0"/>
+              </a:ext>
+            </a:extLst>
+          </a:blip>
+          <a:stretch>
+            <a:fillRect/>
+          </a:stretch>
+        </p:blipFill>
+        <p:spPr>
+          <a:xfrm>
+            <a:off x="9680842" y="4178118"/>
+            <a:ext cx="1279547" cy="1279547"/>
+          </a:xfrm>
+          <a:prstGeom prst="rect">
+            <a:avLst/>
+          </a:prstGeom>
+        </p:spPr>
+      </p:pic>
+      <p:pic>
+        <p:nvPicPr>
+          <p:cNvPr id="6" name="Image 5">
+            <a:extLst>
+              <a:ext uri="{FF2B5EF4-FFF2-40B4-BE49-F238E27FC236}">
+                <a16:creationId xmlns:a16="http://schemas.microsoft.com/office/drawing/2014/main" id="{B65D6EAF-86B9-4E46-A9E9-9C6634C39DAD}"/>
+              </a:ext>
+            </a:extLst>
+          </p:cNvPr>
+          <p:cNvPicPr>
+            <a:picLocks noChangeAspect="1"/>
+          </p:cNvPicPr>
+          <p:nvPr/>
+        </p:nvPicPr>
+        <p:blipFill>
+          <a:blip r:embed="rId4">
+            <a:extLst>
+              <a:ext uri="{28A0092B-C50C-407E-A947-70E740481C1C}">
+                <a14:useLocalDpi xmlns:a14="http://schemas.microsoft.com/office/drawing/2010/main" val="0"/>
+              </a:ext>
+            </a:extLst>
+          </a:blip>
+          <a:stretch>
+            <a:fillRect/>
+          </a:stretch>
+        </p:blipFill>
+        <p:spPr>
+          <a:xfrm>
+            <a:off x="10596210" y="4844262"/>
+            <a:ext cx="884391" cy="884391"/>
+          </a:xfrm>
+          <a:prstGeom prst="rect">
+            <a:avLst/>
+          </a:prstGeom>
+        </p:spPr>
+      </p:pic>
+      <p:pic>
+        <p:nvPicPr>
+          <p:cNvPr id="8" name="Image 7">
+            <a:extLst>
+              <a:ext uri="{FF2B5EF4-FFF2-40B4-BE49-F238E27FC236}">
+                <a16:creationId xmlns:a16="http://schemas.microsoft.com/office/drawing/2014/main" id="{8F3BC8FE-8B92-447A-8E55-F05647177BE6}"/>
+              </a:ext>
+            </a:extLst>
+          </p:cNvPr>
+          <p:cNvPicPr>
+            <a:picLocks noChangeAspect="1"/>
+          </p:cNvPicPr>
+          <p:nvPr/>
+        </p:nvPicPr>
+        <p:blipFill>
+          <a:blip r:embed="rId5">
+            <a:extLst>
+              <a:ext uri="{28A0092B-C50C-407E-A947-70E740481C1C}">
+                <a14:useLocalDpi xmlns:a14="http://schemas.microsoft.com/office/drawing/2010/main" val="0"/>
+              </a:ext>
+            </a:extLst>
+          </a:blip>
+          <a:stretch>
+            <a:fillRect/>
+          </a:stretch>
+        </p:blipFill>
+        <p:spPr>
+          <a:xfrm>
+            <a:off x="2941320" y="2267659"/>
+            <a:ext cx="1592580" cy="1592580"/>
+          </a:xfrm>
+          <a:prstGeom prst="rect">
+            <a:avLst/>
+          </a:prstGeom>
+        </p:spPr>
+      </p:pic>
+      <p:pic>
+        <p:nvPicPr>
+          <p:cNvPr id="15" name="Image 14">
+            <a:extLst>
+              <a:ext uri="{FF2B5EF4-FFF2-40B4-BE49-F238E27FC236}">
+                <a16:creationId xmlns:a16="http://schemas.microsoft.com/office/drawing/2014/main" id="{E10BEBB0-2A3A-488E-926A-64159F5FFBAB}"/>
+              </a:ext>
+            </a:extLst>
+          </p:cNvPr>
+          <p:cNvPicPr>
+            <a:picLocks noChangeAspect="1"/>
+          </p:cNvPicPr>
+          <p:nvPr/>
+        </p:nvPicPr>
+        <p:blipFill>
+          <a:blip r:embed="rId2">
+            <a:extLst>
+              <a:ext uri="{28A0092B-C50C-407E-A947-70E740481C1C}">
+                <a14:useLocalDpi xmlns:a14="http://schemas.microsoft.com/office/drawing/2010/main" val="0"/>
+              </a:ext>
+            </a:extLst>
+          </a:blip>
+          <a:stretch>
+            <a:fillRect/>
+          </a:stretch>
+        </p:blipFill>
+        <p:spPr>
+          <a:xfrm>
+            <a:off x="5669456" y="828277"/>
+            <a:ext cx="3646714" cy="3646714"/>
+          </a:xfrm>
+          <a:prstGeom prst="rect">
+            <a:avLst/>
+          </a:prstGeom>
+        </p:spPr>
+      </p:pic>
+      <p:sp>
+        <p:nvSpPr>
+          <p:cNvPr id="17" name="ZoneTexte 16">
+            <a:extLst>
+              <a:ext uri="{FF2B5EF4-FFF2-40B4-BE49-F238E27FC236}">
+                <a16:creationId xmlns:a16="http://schemas.microsoft.com/office/drawing/2014/main" id="{2B28C72D-C79E-48C3-A34D-79A418D83AB6}"/>
+              </a:ext>
+            </a:extLst>
+          </p:cNvPr>
+          <p:cNvSpPr txBox="1"/>
+          <p:nvPr/>
+        </p:nvSpPr>
+        <p:spPr>
+          <a:xfrm>
+            <a:off x="6258740" y="1385227"/>
+            <a:ext cx="1650820" cy="738664"/>
+          </a:xfrm>
+          <a:prstGeom prst="rect">
+            <a:avLst/>
+          </a:prstGeom>
+          <a:noFill/>
+        </p:spPr>
+        <p:txBody>
+          <a:bodyPr wrap="square" lIns="0" tIns="0" rIns="0" bIns="0" rtlCol="0">
+            <a:spAutoFit/>
+          </a:bodyPr>
+          <a:lstStyle/>
+          <a:p>
+            <a:r>
+              <a:rPr lang="en-US" sz="4800" b="1" dirty="0">
+                <a:solidFill>
+                  <a:srgbClr val="C00000"/>
+                </a:solidFill>
+                <a:latin typeface="Tahoma" panose="020B0604030504040204" pitchFamily="34" charset="0"/>
+                <a:ea typeface="Tahoma" panose="020B0604030504040204" pitchFamily="34" charset="0"/>
+                <a:cs typeface="Tahoma" panose="020B0604030504040204" pitchFamily="34" charset="0"/>
+              </a:rPr>
+              <a:t>DOC</a:t>
+            </a:r>
+          </a:p>
+        </p:txBody>
+      </p:sp>
+      <p:pic>
+        <p:nvPicPr>
+          <p:cNvPr id="19" name="Image 18">
+            <a:extLst>
+              <a:ext uri="{FF2B5EF4-FFF2-40B4-BE49-F238E27FC236}">
+                <a16:creationId xmlns:a16="http://schemas.microsoft.com/office/drawing/2014/main" id="{78BFC9FB-675F-4BEC-B6E0-39861E34548A}"/>
+              </a:ext>
+            </a:extLst>
+          </p:cNvPr>
+          <p:cNvPicPr>
+            <a:picLocks noChangeAspect="1"/>
+          </p:cNvPicPr>
+          <p:nvPr/>
+        </p:nvPicPr>
+        <p:blipFill>
+          <a:blip r:embed="rId3">
+            <a:extLst>
+              <a:ext uri="{28A0092B-C50C-407E-A947-70E740481C1C}">
+                <a14:useLocalDpi xmlns:a14="http://schemas.microsoft.com/office/drawing/2010/main" val="0"/>
+              </a:ext>
+            </a:extLst>
+          </a:blip>
+          <a:stretch>
+            <a:fillRect/>
+          </a:stretch>
+        </p:blipFill>
+        <p:spPr>
+          <a:xfrm>
+            <a:off x="3241598" y="4384428"/>
+            <a:ext cx="1716237" cy="1716237"/>
+          </a:xfrm>
+          <a:prstGeom prst="rect">
+            <a:avLst/>
+          </a:prstGeom>
+        </p:spPr>
+      </p:pic>
+      <p:pic>
+        <p:nvPicPr>
+          <p:cNvPr id="12" name="Image 11">
+            <a:extLst>
+              <a:ext uri="{FF2B5EF4-FFF2-40B4-BE49-F238E27FC236}">
+                <a16:creationId xmlns:a16="http://schemas.microsoft.com/office/drawing/2014/main" id="{ABF38D2E-D085-48A7-A947-EEAE281DEB1A}"/>
+              </a:ext>
+            </a:extLst>
+          </p:cNvPr>
+          <p:cNvPicPr>
+            <a:picLocks noChangeAspect="1"/>
+          </p:cNvPicPr>
+          <p:nvPr/>
+        </p:nvPicPr>
+        <p:blipFill>
+          <a:blip r:embed="rId6">
+            <a:extLst>
+              <a:ext uri="{28A0092B-C50C-407E-A947-70E740481C1C}">
+                <a14:useLocalDpi xmlns:a14="http://schemas.microsoft.com/office/drawing/2010/main" val="0"/>
+              </a:ext>
+            </a:extLst>
+          </a:blip>
+          <a:stretch>
+            <a:fillRect/>
+          </a:stretch>
+        </p:blipFill>
+        <p:spPr>
+          <a:xfrm>
+            <a:off x="7184707" y="2422916"/>
+            <a:ext cx="1510665" cy="1510665"/>
+          </a:xfrm>
+          <a:prstGeom prst="rect">
+            <a:avLst/>
+          </a:prstGeom>
+        </p:spPr>
+      </p:pic>
+      <p:cxnSp>
+        <p:nvCxnSpPr>
+          <p:cNvPr id="20" name="Connecteur droit 19">
+            <a:extLst>
+              <a:ext uri="{FF2B5EF4-FFF2-40B4-BE49-F238E27FC236}">
+                <a16:creationId xmlns:a16="http://schemas.microsoft.com/office/drawing/2014/main" id="{B1D23D58-E645-4397-A457-E7379406C55D}"/>
+              </a:ext>
+            </a:extLst>
+          </p:cNvPr>
+          <p:cNvCxnSpPr/>
+          <p:nvPr/>
+        </p:nvCxnSpPr>
+        <p:spPr>
+          <a:xfrm>
+            <a:off x="5509260" y="1174497"/>
+            <a:ext cx="0" cy="2884331"/>
+          </a:xfrm>
+          <a:prstGeom prst="line">
+            <a:avLst/>
+          </a:prstGeom>
+        </p:spPr>
+        <p:style>
+          <a:lnRef idx="1">
+            <a:schemeClr val="accent1"/>
+          </a:lnRef>
+          <a:fillRef idx="0">
+            <a:schemeClr val="accent1"/>
+          </a:fillRef>
+          <a:effectRef idx="0">
+            <a:schemeClr val="accent1"/>
+          </a:effectRef>
+          <a:fontRef idx="minor">
+            <a:schemeClr val="tx1"/>
+          </a:fontRef>
+        </p:style>
+      </p:cxnSp>
+    </p:spTree>
+    <p:extLst>
+      <p:ext uri="{BB962C8B-B14F-4D97-AF65-F5344CB8AC3E}">
+        <p14:creationId xmlns:p14="http://schemas.microsoft.com/office/powerpoint/2010/main" val="98324256"/>
+      </p:ext>
+    </p:extLst>
+  </p:cSld>
+  <p:clrMapOvr>
+    <a:masterClrMapping/>
+  </p:clrMapOvr>
+</p:sld>
+</file>
+
 <file path=ppt/theme/theme1.xml><?xml version="1.0" encoding="utf-8"?>
 <a:theme xmlns:a="http://schemas.openxmlformats.org/drawingml/2006/main" name="Thème Office">
   <a:themeElements>

</xml_diff>

<commit_message>
New icon for GitHub Telosys models
</commit_message>
<xml_diff>
--- a/icons/icons-for-github/v3/Telosys-v3-GitHub-Icones.pptx
+++ b/icons/icons-for-github/v3/Telosys-v3-GitHub-Icones.pptx
@@ -5,10 +5,12 @@
     <p:sldMasterId id="2147483648" r:id="rId1"/>
   </p:sldMasterIdLst>
   <p:sldIdLst>
-    <p:sldId id="256" r:id="rId2"/>
-    <p:sldId id="257" r:id="rId3"/>
-    <p:sldId id="258" r:id="rId4"/>
-    <p:sldId id="259" r:id="rId5"/>
+    <p:sldId id="261" r:id="rId2"/>
+    <p:sldId id="256" r:id="rId3"/>
+    <p:sldId id="260" r:id="rId4"/>
+    <p:sldId id="257" r:id="rId5"/>
+    <p:sldId id="258" r:id="rId6"/>
+    <p:sldId id="259" r:id="rId7"/>
   </p:sldIdLst>
   <p:sldSz cx="12192000" cy="6858000"/>
   <p:notesSz cx="6858000" cy="9144000"/>
@@ -262,7 +264,7 @@
           <a:p>
             <a:fld id="{FAEABA7C-D0C0-4E4D-9FB6-966D6CEA2D6D}" type="datetimeFigureOut">
               <a:rPr lang="fr-FR" smtClean="0"/>
-              <a:t>18/12/2019</a:t>
+              <a:t>30/08/2022</a:t>
             </a:fld>
             <a:endParaRPr lang="fr-FR"/>
           </a:p>
@@ -460,7 +462,7 @@
           <a:p>
             <a:fld id="{FAEABA7C-D0C0-4E4D-9FB6-966D6CEA2D6D}" type="datetimeFigureOut">
               <a:rPr lang="fr-FR" smtClean="0"/>
-              <a:t>18/12/2019</a:t>
+              <a:t>30/08/2022</a:t>
             </a:fld>
             <a:endParaRPr lang="fr-FR"/>
           </a:p>
@@ -668,7 +670,7 @@
           <a:p>
             <a:fld id="{FAEABA7C-D0C0-4E4D-9FB6-966D6CEA2D6D}" type="datetimeFigureOut">
               <a:rPr lang="fr-FR" smtClean="0"/>
-              <a:t>18/12/2019</a:t>
+              <a:t>30/08/2022</a:t>
             </a:fld>
             <a:endParaRPr lang="fr-FR"/>
           </a:p>
@@ -866,7 +868,7 @@
           <a:p>
             <a:fld id="{FAEABA7C-D0C0-4E4D-9FB6-966D6CEA2D6D}" type="datetimeFigureOut">
               <a:rPr lang="fr-FR" smtClean="0"/>
-              <a:t>18/12/2019</a:t>
+              <a:t>30/08/2022</a:t>
             </a:fld>
             <a:endParaRPr lang="fr-FR"/>
           </a:p>
@@ -1141,7 +1143,7 @@
           <a:p>
             <a:fld id="{FAEABA7C-D0C0-4E4D-9FB6-966D6CEA2D6D}" type="datetimeFigureOut">
               <a:rPr lang="fr-FR" smtClean="0"/>
-              <a:t>18/12/2019</a:t>
+              <a:t>30/08/2022</a:t>
             </a:fld>
             <a:endParaRPr lang="fr-FR"/>
           </a:p>
@@ -1406,7 +1408,7 @@
           <a:p>
             <a:fld id="{FAEABA7C-D0C0-4E4D-9FB6-966D6CEA2D6D}" type="datetimeFigureOut">
               <a:rPr lang="fr-FR" smtClean="0"/>
-              <a:t>18/12/2019</a:t>
+              <a:t>30/08/2022</a:t>
             </a:fld>
             <a:endParaRPr lang="fr-FR"/>
           </a:p>
@@ -1818,7 +1820,7 @@
           <a:p>
             <a:fld id="{FAEABA7C-D0C0-4E4D-9FB6-966D6CEA2D6D}" type="datetimeFigureOut">
               <a:rPr lang="fr-FR" smtClean="0"/>
-              <a:t>18/12/2019</a:t>
+              <a:t>30/08/2022</a:t>
             </a:fld>
             <a:endParaRPr lang="fr-FR"/>
           </a:p>
@@ -1959,7 +1961,7 @@
           <a:p>
             <a:fld id="{FAEABA7C-D0C0-4E4D-9FB6-966D6CEA2D6D}" type="datetimeFigureOut">
               <a:rPr lang="fr-FR" smtClean="0"/>
-              <a:t>18/12/2019</a:t>
+              <a:t>30/08/2022</a:t>
             </a:fld>
             <a:endParaRPr lang="fr-FR"/>
           </a:p>
@@ -2072,7 +2074,7 @@
           <a:p>
             <a:fld id="{FAEABA7C-D0C0-4E4D-9FB6-966D6CEA2D6D}" type="datetimeFigureOut">
               <a:rPr lang="fr-FR" smtClean="0"/>
-              <a:t>18/12/2019</a:t>
+              <a:t>30/08/2022</a:t>
             </a:fld>
             <a:endParaRPr lang="fr-FR"/>
           </a:p>
@@ -2383,7 +2385,7 @@
           <a:p>
             <a:fld id="{FAEABA7C-D0C0-4E4D-9FB6-966D6CEA2D6D}" type="datetimeFigureOut">
               <a:rPr lang="fr-FR" smtClean="0"/>
-              <a:t>18/12/2019</a:t>
+              <a:t>30/08/2022</a:t>
             </a:fld>
             <a:endParaRPr lang="fr-FR"/>
           </a:p>
@@ -2671,7 +2673,7 @@
           <a:p>
             <a:fld id="{FAEABA7C-D0C0-4E4D-9FB6-966D6CEA2D6D}" type="datetimeFigureOut">
               <a:rPr lang="fr-FR" smtClean="0"/>
-              <a:t>18/12/2019</a:t>
+              <a:t>30/08/2022</a:t>
             </a:fld>
             <a:endParaRPr lang="fr-FR"/>
           </a:p>
@@ -2912,7 +2914,7 @@
           <a:p>
             <a:fld id="{FAEABA7C-D0C0-4E4D-9FB6-966D6CEA2D6D}" type="datetimeFigureOut">
               <a:rPr lang="fr-FR" smtClean="0"/>
-              <a:t>18/12/2019</a:t>
+              <a:t>30/08/2022</a:t>
             </a:fld>
             <a:endParaRPr lang="fr-FR"/>
           </a:p>
@@ -3329,84 +3331,12 @@
           <a:chExt cx="0" cy="0"/>
         </a:xfrm>
       </p:grpSpPr>
-      <p:pic>
-        <p:nvPicPr>
-          <p:cNvPr id="5" name="Image 4">
-            <a:extLst>
-              <a:ext uri="{FF2B5EF4-FFF2-40B4-BE49-F238E27FC236}">
-                <a16:creationId xmlns:a16="http://schemas.microsoft.com/office/drawing/2014/main" id="{C345F049-F309-4CC2-9648-D43C4DD6D690}"/>
-              </a:ext>
-            </a:extLst>
-          </p:cNvPr>
-          <p:cNvPicPr>
-            <a:picLocks noChangeAspect="1"/>
-          </p:cNvPicPr>
-          <p:nvPr/>
-        </p:nvPicPr>
-        <p:blipFill>
-          <a:blip r:embed="rId2">
-            <a:extLst>
-              <a:ext uri="{28A0092B-C50C-407E-A947-70E740481C1C}">
-                <a14:useLocalDpi xmlns:a14="http://schemas.microsoft.com/office/drawing/2010/main" val="0"/>
-              </a:ext>
-            </a:extLst>
-          </a:blip>
-          <a:stretch>
-            <a:fillRect/>
-          </a:stretch>
-        </p:blipFill>
-        <p:spPr>
-          <a:xfrm>
-            <a:off x="1278293" y="757335"/>
-            <a:ext cx="3646714" cy="3646714"/>
-          </a:xfrm>
-          <a:prstGeom prst="rect">
-            <a:avLst/>
-          </a:prstGeom>
-        </p:spPr>
-      </p:pic>
-      <p:pic>
-        <p:nvPicPr>
-          <p:cNvPr id="9" name="Image 8">
-            <a:extLst>
-              <a:ext uri="{FF2B5EF4-FFF2-40B4-BE49-F238E27FC236}">
-                <a16:creationId xmlns:a16="http://schemas.microsoft.com/office/drawing/2014/main" id="{B77586A5-ACF1-47B0-86E8-9FDA5A226074}"/>
-              </a:ext>
-            </a:extLst>
-          </p:cNvPr>
-          <p:cNvPicPr>
-            <a:picLocks noChangeAspect="1"/>
-          </p:cNvPicPr>
-          <p:nvPr/>
-        </p:nvPicPr>
-        <p:blipFill>
-          <a:blip r:embed="rId3">
-            <a:extLst>
-              <a:ext uri="{28A0092B-C50C-407E-A947-70E740481C1C}">
-                <a14:useLocalDpi xmlns:a14="http://schemas.microsoft.com/office/drawing/2010/main" val="0"/>
-              </a:ext>
-            </a:extLst>
-          </a:blip>
-          <a:stretch>
-            <a:fillRect/>
-          </a:stretch>
-        </p:blipFill>
-        <p:spPr>
-          <a:xfrm>
-            <a:off x="2926352" y="2316256"/>
-            <a:ext cx="1881924" cy="1881924"/>
-          </a:xfrm>
-          <a:prstGeom prst="rect">
-            <a:avLst/>
-          </a:prstGeom>
-        </p:spPr>
-      </p:pic>
-      <p:sp>
-        <p:nvSpPr>
-          <p:cNvPr id="10" name="ZoneTexte 9">
-            <a:extLst>
-              <a:ext uri="{FF2B5EF4-FFF2-40B4-BE49-F238E27FC236}">
-                <a16:creationId xmlns:a16="http://schemas.microsoft.com/office/drawing/2014/main" id="{5FBCB245-5AFB-4C89-B5F1-758EDEDBE1C2}"/>
+      <p:sp>
+        <p:nvSpPr>
+          <p:cNvPr id="4" name="ZoneTexte 3">
+            <a:extLst>
+              <a:ext uri="{FF2B5EF4-FFF2-40B4-BE49-F238E27FC236}">
+                <a16:creationId xmlns:a16="http://schemas.microsoft.com/office/drawing/2014/main" id="{6EE843AC-0972-4A17-93C3-0EB108215EBB}"/>
               </a:ext>
             </a:extLst>
           </p:cNvPr>
@@ -3415,8 +3345,8 @@
         </p:nvSpPr>
         <p:spPr>
           <a:xfrm>
-            <a:off x="3264133" y="2440537"/>
-            <a:ext cx="720000" cy="553998"/>
+            <a:off x="0" y="2281382"/>
+            <a:ext cx="12192000" cy="523220"/>
           </a:xfrm>
           <a:prstGeom prst="rect">
             <a:avLst/>
@@ -3424,103 +3354,25 @@
           <a:noFill/>
         </p:spPr>
         <p:txBody>
-          <a:bodyPr wrap="square" lIns="0" tIns="0" rIns="0" bIns="0" rtlCol="0">
+          <a:bodyPr wrap="square" rtlCol="0">
             <a:spAutoFit/>
           </a:bodyPr>
           <a:lstStyle/>
           <a:p>
-            <a:r>
-              <a:rPr lang="fr-FR" sz="3600" b="1" dirty="0">
-                <a:solidFill>
-                  <a:srgbClr val="C00000"/>
-                </a:solidFill>
-                <a:latin typeface="Tahoma" panose="020B0604030504040204" pitchFamily="34" charset="0"/>
-                <a:ea typeface="Tahoma" panose="020B0604030504040204" pitchFamily="34" charset="0"/>
-                <a:cs typeface="Tahoma" panose="020B0604030504040204" pitchFamily="34" charset="0"/>
-              </a:rPr>
-              <a:t>VM</a:t>
-            </a:r>
-          </a:p>
-        </p:txBody>
-      </p:sp>
-      <p:pic>
-        <p:nvPicPr>
-          <p:cNvPr id="14" name="Image 13">
-            <a:extLst>
-              <a:ext uri="{FF2B5EF4-FFF2-40B4-BE49-F238E27FC236}">
-                <a16:creationId xmlns:a16="http://schemas.microsoft.com/office/drawing/2014/main" id="{BEBD053C-CFC4-43E0-BAEF-5F4001C471E3}"/>
-              </a:ext>
-            </a:extLst>
-          </p:cNvPr>
-          <p:cNvPicPr>
-            <a:picLocks noChangeAspect="1"/>
-          </p:cNvPicPr>
-          <p:nvPr/>
-        </p:nvPicPr>
-        <p:blipFill>
-          <a:blip r:embed="rId2">
-            <a:extLst>
-              <a:ext uri="{28A0092B-C50C-407E-A947-70E740481C1C}">
-                <a14:useLocalDpi xmlns:a14="http://schemas.microsoft.com/office/drawing/2010/main" val="0"/>
-              </a:ext>
-            </a:extLst>
-          </a:blip>
-          <a:stretch>
-            <a:fillRect/>
-          </a:stretch>
-        </p:blipFill>
-        <p:spPr>
-          <a:xfrm>
-            <a:off x="6673902" y="1171178"/>
-            <a:ext cx="3646714" cy="3646714"/>
-          </a:xfrm>
-          <a:prstGeom prst="rect">
-            <a:avLst/>
-          </a:prstGeom>
-        </p:spPr>
-      </p:pic>
-      <p:pic>
-        <p:nvPicPr>
-          <p:cNvPr id="18" name="Image 17">
-            <a:extLst>
-              <a:ext uri="{FF2B5EF4-FFF2-40B4-BE49-F238E27FC236}">
-                <a16:creationId xmlns:a16="http://schemas.microsoft.com/office/drawing/2014/main" id="{DB1C73E8-CE49-4F53-BE6E-87FA21CAF82C}"/>
-              </a:ext>
-            </a:extLst>
-          </p:cNvPr>
-          <p:cNvPicPr>
-            <a:picLocks noChangeAspect="1"/>
-          </p:cNvPicPr>
-          <p:nvPr/>
-        </p:nvPicPr>
-        <p:blipFill>
-          <a:blip r:embed="rId4">
-            <a:extLst>
-              <a:ext uri="{28A0092B-C50C-407E-A947-70E740481C1C}">
-                <a14:useLocalDpi xmlns:a14="http://schemas.microsoft.com/office/drawing/2010/main" val="0"/>
-              </a:ext>
-            </a:extLst>
-          </a:blip>
-          <a:stretch>
-            <a:fillRect/>
-          </a:stretch>
-        </p:blipFill>
-        <p:spPr>
-          <a:xfrm>
-            <a:off x="8279858" y="2814814"/>
-            <a:ext cx="1536970" cy="1536970"/>
-          </a:xfrm>
-          <a:prstGeom prst="rect">
-            <a:avLst/>
-          </a:prstGeom>
-        </p:spPr>
-      </p:pic>
-      <p:sp>
-        <p:nvSpPr>
-          <p:cNvPr id="16" name="ZoneTexte 15">
-            <a:extLst>
-              <a:ext uri="{FF2B5EF4-FFF2-40B4-BE49-F238E27FC236}">
-                <a16:creationId xmlns:a16="http://schemas.microsoft.com/office/drawing/2014/main" id="{BC576366-87DB-4C85-B7EA-02176F7145E3}"/>
+            <a:pPr algn="ctr"/>
+            <a:r>
+              <a:rPr lang="en-US" sz="2800" b="1" dirty="0"/>
+              <a:t>Icons for GitHub organizations </a:t>
+            </a:r>
+          </a:p>
+        </p:txBody>
+      </p:sp>
+      <p:sp>
+        <p:nvSpPr>
+          <p:cNvPr id="5" name="ZoneTexte 4">
+            <a:extLst>
+              <a:ext uri="{FF2B5EF4-FFF2-40B4-BE49-F238E27FC236}">
+                <a16:creationId xmlns:a16="http://schemas.microsoft.com/office/drawing/2014/main" id="{354CB17A-EEBB-400C-87D0-B9935836B479}"/>
               </a:ext>
             </a:extLst>
           </p:cNvPr>
@@ -3529,8 +3381,8 @@
         </p:nvSpPr>
         <p:spPr>
           <a:xfrm>
-            <a:off x="8688343" y="3306300"/>
-            <a:ext cx="720000" cy="553998"/>
+            <a:off x="822036" y="5052292"/>
+            <a:ext cx="2515497" cy="369332"/>
           </a:xfrm>
           <a:prstGeom prst="rect">
             <a:avLst/>
@@ -3538,29 +3390,27 @@
           <a:noFill/>
         </p:spPr>
         <p:txBody>
-          <a:bodyPr wrap="square" lIns="0" tIns="0" rIns="0" bIns="0" rtlCol="0">
+          <a:bodyPr wrap="none" rtlCol="0">
             <a:spAutoFit/>
           </a:bodyPr>
           <a:lstStyle/>
           <a:p>
             <a:r>
-              <a:rPr lang="fr-FR" sz="3600" b="1" dirty="0">
-                <a:solidFill>
-                  <a:srgbClr val="C00000"/>
-                </a:solidFill>
-                <a:latin typeface="Tahoma" panose="020B0604030504040204" pitchFamily="34" charset="0"/>
-                <a:ea typeface="Tahoma" panose="020B0604030504040204" pitchFamily="34" charset="0"/>
-                <a:cs typeface="Tahoma" panose="020B0604030504040204" pitchFamily="34" charset="0"/>
-              </a:rPr>
-              <a:t>VM</a:t>
-            </a:r>
+              <a:rPr lang="fr-FR"/>
+              <a:t>Launch diaporama </a:t>
+            </a:r>
+            <a:r>
+              <a:rPr lang="fr-FR" dirty="0"/>
+              <a:t>+ Cut </a:t>
+            </a:r>
+            <a:endParaRPr lang="en-US" dirty="0"/>
           </a:p>
         </p:txBody>
       </p:sp>
     </p:spTree>
     <p:extLst>
       <p:ext uri="{BB962C8B-B14F-4D97-AF65-F5344CB8AC3E}">
-        <p14:creationId xmlns:p14="http://schemas.microsoft.com/office/powerpoint/2010/main" val="1687480670"/>
+        <p14:creationId xmlns:p14="http://schemas.microsoft.com/office/powerpoint/2010/main" val="2047880467"/>
       </p:ext>
     </p:extLst>
   </p:cSld>
@@ -3589,10 +3439,10 @@
       </p:grpSpPr>
       <p:pic>
         <p:nvPicPr>
-          <p:cNvPr id="13" name="Image 12">
-            <a:extLst>
-              <a:ext uri="{FF2B5EF4-FFF2-40B4-BE49-F238E27FC236}">
-                <a16:creationId xmlns:a16="http://schemas.microsoft.com/office/drawing/2014/main" id="{3306D9C5-1283-4BF1-B89D-BDB6A80B6C3F}"/>
+          <p:cNvPr id="5" name="Image 4">
+            <a:extLst>
+              <a:ext uri="{FF2B5EF4-FFF2-40B4-BE49-F238E27FC236}">
+                <a16:creationId xmlns:a16="http://schemas.microsoft.com/office/drawing/2014/main" id="{C345F049-F309-4CC2-9648-D43C4DD6D690}"/>
               </a:ext>
             </a:extLst>
           </p:cNvPr>
@@ -3615,7 +3465,7 @@
         </p:blipFill>
         <p:spPr>
           <a:xfrm>
-            <a:off x="5549523" y="0"/>
+            <a:off x="1278293" y="757335"/>
             <a:ext cx="3646714" cy="3646714"/>
           </a:xfrm>
           <a:prstGeom prst="rect">
@@ -3625,10 +3475,88 @@
       </p:pic>
       <p:pic>
         <p:nvPicPr>
-          <p:cNvPr id="8" name="Image 7">
-            <a:extLst>
-              <a:ext uri="{FF2B5EF4-FFF2-40B4-BE49-F238E27FC236}">
-                <a16:creationId xmlns:a16="http://schemas.microsoft.com/office/drawing/2014/main" id="{94484C4C-AA6C-4399-B64A-B4E71EA044B8}"/>
+          <p:cNvPr id="9" name="Image 8">
+            <a:extLst>
+              <a:ext uri="{FF2B5EF4-FFF2-40B4-BE49-F238E27FC236}">
+                <a16:creationId xmlns:a16="http://schemas.microsoft.com/office/drawing/2014/main" id="{B77586A5-ACF1-47B0-86E8-9FDA5A226074}"/>
+              </a:ext>
+            </a:extLst>
+          </p:cNvPr>
+          <p:cNvPicPr>
+            <a:picLocks noChangeAspect="1"/>
+          </p:cNvPicPr>
+          <p:nvPr/>
+        </p:nvPicPr>
+        <p:blipFill>
+          <a:blip r:embed="rId3">
+            <a:extLst>
+              <a:ext uri="{28A0092B-C50C-407E-A947-70E740481C1C}">
+                <a14:useLocalDpi xmlns:a14="http://schemas.microsoft.com/office/drawing/2010/main" val="0"/>
+              </a:ext>
+            </a:extLst>
+          </a:blip>
+          <a:stretch>
+            <a:fillRect/>
+          </a:stretch>
+        </p:blipFill>
+        <p:spPr>
+          <a:xfrm>
+            <a:off x="2926352" y="2316256"/>
+            <a:ext cx="1881924" cy="1881924"/>
+          </a:xfrm>
+          <a:prstGeom prst="rect">
+            <a:avLst/>
+          </a:prstGeom>
+        </p:spPr>
+      </p:pic>
+      <p:sp>
+        <p:nvSpPr>
+          <p:cNvPr id="10" name="ZoneTexte 9">
+            <a:extLst>
+              <a:ext uri="{FF2B5EF4-FFF2-40B4-BE49-F238E27FC236}">
+                <a16:creationId xmlns:a16="http://schemas.microsoft.com/office/drawing/2014/main" id="{5FBCB245-5AFB-4C89-B5F1-758EDEDBE1C2}"/>
+              </a:ext>
+            </a:extLst>
+          </p:cNvPr>
+          <p:cNvSpPr txBox="1"/>
+          <p:nvPr/>
+        </p:nvSpPr>
+        <p:spPr>
+          <a:xfrm>
+            <a:off x="3264133" y="2440537"/>
+            <a:ext cx="720000" cy="553998"/>
+          </a:xfrm>
+          <a:prstGeom prst="rect">
+            <a:avLst/>
+          </a:prstGeom>
+          <a:noFill/>
+        </p:spPr>
+        <p:txBody>
+          <a:bodyPr wrap="square" lIns="0" tIns="0" rIns="0" bIns="0" rtlCol="0">
+            <a:spAutoFit/>
+          </a:bodyPr>
+          <a:lstStyle/>
+          <a:p>
+            <a:r>
+              <a:rPr lang="fr-FR" sz="3600" b="1" dirty="0">
+                <a:solidFill>
+                  <a:srgbClr val="C00000"/>
+                </a:solidFill>
+                <a:latin typeface="Tahoma" panose="020B0604030504040204" pitchFamily="34" charset="0"/>
+                <a:ea typeface="Tahoma" panose="020B0604030504040204" pitchFamily="34" charset="0"/>
+                <a:cs typeface="Tahoma" panose="020B0604030504040204" pitchFamily="34" charset="0"/>
+              </a:rPr>
+              <a:t>VM</a:t>
+            </a:r>
+          </a:p>
+        </p:txBody>
+      </p:sp>
+      <p:pic>
+        <p:nvPicPr>
+          <p:cNvPr id="14" name="Image 13">
+            <a:extLst>
+              <a:ext uri="{FF2B5EF4-FFF2-40B4-BE49-F238E27FC236}">
+                <a16:creationId xmlns:a16="http://schemas.microsoft.com/office/drawing/2014/main" id="{BEBD053C-CFC4-43E0-BAEF-5F4001C471E3}"/>
               </a:ext>
             </a:extLst>
           </p:cNvPr>
@@ -3651,7 +3579,7 @@
         </p:blipFill>
         <p:spPr>
           <a:xfrm>
-            <a:off x="352562" y="91864"/>
+            <a:off x="6673902" y="1171178"/>
             <a:ext cx="3646714" cy="3646714"/>
           </a:xfrm>
           <a:prstGeom prst="rect">
@@ -3661,46 +3589,10 @@
       </p:pic>
       <p:pic>
         <p:nvPicPr>
-          <p:cNvPr id="3" name="Image 2">
-            <a:extLst>
-              <a:ext uri="{FF2B5EF4-FFF2-40B4-BE49-F238E27FC236}">
-                <a16:creationId xmlns:a16="http://schemas.microsoft.com/office/drawing/2014/main" id="{33781ED0-36CF-4C9F-8C41-C619AC94E1A0}"/>
-              </a:ext>
-            </a:extLst>
-          </p:cNvPr>
-          <p:cNvPicPr>
-            <a:picLocks noChangeAspect="1"/>
-          </p:cNvPicPr>
-          <p:nvPr/>
-        </p:nvPicPr>
-        <p:blipFill>
-          <a:blip r:embed="rId3">
-            <a:extLst>
-              <a:ext uri="{28A0092B-C50C-407E-A947-70E740481C1C}">
-                <a14:useLocalDpi xmlns:a14="http://schemas.microsoft.com/office/drawing/2010/main" val="0"/>
-              </a:ext>
-            </a:extLst>
-          </a:blip>
-          <a:stretch>
-            <a:fillRect/>
-          </a:stretch>
-        </p:blipFill>
-        <p:spPr>
-          <a:xfrm>
-            <a:off x="2175919" y="2085341"/>
-            <a:ext cx="1599000" cy="1199250"/>
-          </a:xfrm>
-          <a:prstGeom prst="rect">
-            <a:avLst/>
-          </a:prstGeom>
-        </p:spPr>
-      </p:pic>
-      <p:pic>
-        <p:nvPicPr>
-          <p:cNvPr id="6" name="Image 5">
-            <a:extLst>
-              <a:ext uri="{FF2B5EF4-FFF2-40B4-BE49-F238E27FC236}">
-                <a16:creationId xmlns:a16="http://schemas.microsoft.com/office/drawing/2014/main" id="{E974D7EC-A64E-4C62-8F1F-EABAAECAFA4C}"/>
+          <p:cNvPr id="18" name="Image 17">
+            <a:extLst>
+              <a:ext uri="{FF2B5EF4-FFF2-40B4-BE49-F238E27FC236}">
+                <a16:creationId xmlns:a16="http://schemas.microsoft.com/office/drawing/2014/main" id="{DB1C73E8-CE49-4F53-BE6E-87FA21CAF82C}"/>
               </a:ext>
             </a:extLst>
           </p:cNvPr>
@@ -3723,317 +3615,60 @@
         </p:blipFill>
         <p:spPr>
           <a:xfrm>
-            <a:off x="7372880" y="2085341"/>
-            <a:ext cx="1281131" cy="1155154"/>
+            <a:off x="8279858" y="2814814"/>
+            <a:ext cx="1536970" cy="1536970"/>
           </a:xfrm>
           <a:prstGeom prst="rect">
             <a:avLst/>
           </a:prstGeom>
         </p:spPr>
       </p:pic>
-      <p:pic>
-        <p:nvPicPr>
-          <p:cNvPr id="15" name="Image 14">
-            <a:extLst>
-              <a:ext uri="{FF2B5EF4-FFF2-40B4-BE49-F238E27FC236}">
-                <a16:creationId xmlns:a16="http://schemas.microsoft.com/office/drawing/2014/main" id="{AB124F7F-79D1-4521-97DD-54C74B19B8D4}"/>
-              </a:ext>
-            </a:extLst>
-          </p:cNvPr>
-          <p:cNvPicPr>
-            <a:picLocks noChangeAspect="1"/>
-          </p:cNvPicPr>
+      <p:sp>
+        <p:nvSpPr>
+          <p:cNvPr id="16" name="ZoneTexte 15">
+            <a:extLst>
+              <a:ext uri="{FF2B5EF4-FFF2-40B4-BE49-F238E27FC236}">
+                <a16:creationId xmlns:a16="http://schemas.microsoft.com/office/drawing/2014/main" id="{BC576366-87DB-4C85-B7EA-02176F7145E3}"/>
+              </a:ext>
+            </a:extLst>
+          </p:cNvPr>
+          <p:cNvSpPr txBox="1"/>
           <p:nvPr/>
-        </p:nvPicPr>
-        <p:blipFill>
-          <a:blip r:embed="rId2">
-            <a:extLst>
-              <a:ext uri="{28A0092B-C50C-407E-A947-70E740481C1C}">
-                <a14:useLocalDpi xmlns:a14="http://schemas.microsoft.com/office/drawing/2010/main" val="0"/>
-              </a:ext>
-            </a:extLst>
-          </a:blip>
-          <a:stretch>
-            <a:fillRect/>
-          </a:stretch>
-        </p:blipFill>
-        <p:spPr>
-          <a:xfrm>
-            <a:off x="296527" y="3265555"/>
-            <a:ext cx="3646714" cy="3646714"/>
+        </p:nvSpPr>
+        <p:spPr>
+          <a:xfrm>
+            <a:off x="8688343" y="3306300"/>
+            <a:ext cx="720000" cy="553998"/>
           </a:xfrm>
           <a:prstGeom prst="rect">
             <a:avLst/>
           </a:prstGeom>
-        </p:spPr>
-      </p:pic>
-      <p:pic>
-        <p:nvPicPr>
-          <p:cNvPr id="11" name="Image 10">
-            <a:extLst>
-              <a:ext uri="{FF2B5EF4-FFF2-40B4-BE49-F238E27FC236}">
-                <a16:creationId xmlns:a16="http://schemas.microsoft.com/office/drawing/2014/main" id="{5FC23C24-4E8D-47CC-9FD5-FD62E3743CEC}"/>
-              </a:ext>
-            </a:extLst>
-          </p:cNvPr>
-          <p:cNvPicPr>
-            <a:picLocks noChangeAspect="1"/>
-          </p:cNvPicPr>
-          <p:nvPr/>
-        </p:nvPicPr>
-        <p:blipFill>
-          <a:blip r:embed="rId5">
-            <a:extLst>
-              <a:ext uri="{28A0092B-C50C-407E-A947-70E740481C1C}">
-                <a14:useLocalDpi xmlns:a14="http://schemas.microsoft.com/office/drawing/2010/main" val="0"/>
-              </a:ext>
-            </a:extLst>
-          </a:blip>
-          <a:stretch>
-            <a:fillRect/>
-          </a:stretch>
-        </p:blipFill>
-        <p:spPr>
-          <a:xfrm>
-            <a:off x="2019504" y="4998156"/>
-            <a:ext cx="1387432" cy="1387432"/>
-          </a:xfrm>
-          <a:prstGeom prst="rect">
-            <a:avLst/>
-          </a:prstGeom>
-        </p:spPr>
-      </p:pic>
-      <p:pic>
-        <p:nvPicPr>
-          <p:cNvPr id="17" name="Image 16">
-            <a:extLst>
-              <a:ext uri="{FF2B5EF4-FFF2-40B4-BE49-F238E27FC236}">
-                <a16:creationId xmlns:a16="http://schemas.microsoft.com/office/drawing/2014/main" id="{C6BBBFE9-BD27-4A74-AAB9-4C3A1BE7EB71}"/>
-              </a:ext>
-            </a:extLst>
-          </p:cNvPr>
-          <p:cNvPicPr>
-            <a:picLocks noChangeAspect="1"/>
-          </p:cNvPicPr>
-          <p:nvPr/>
-        </p:nvPicPr>
-        <p:blipFill>
-          <a:blip r:embed="rId2">
-            <a:extLst>
-              <a:ext uri="{28A0092B-C50C-407E-A947-70E740481C1C}">
-                <a14:useLocalDpi xmlns:a14="http://schemas.microsoft.com/office/drawing/2010/main" val="0"/>
-              </a:ext>
-            </a:extLst>
-          </a:blip>
-          <a:stretch>
-            <a:fillRect/>
-          </a:stretch>
-        </p:blipFill>
-        <p:spPr>
-          <a:xfrm>
-            <a:off x="4055311" y="3153824"/>
-            <a:ext cx="3646714" cy="3646714"/>
-          </a:xfrm>
-          <a:prstGeom prst="rect">
-            <a:avLst/>
-          </a:prstGeom>
-        </p:spPr>
-      </p:pic>
-      <p:pic>
-        <p:nvPicPr>
-          <p:cNvPr id="19" name="Image 18">
-            <a:extLst>
-              <a:ext uri="{FF2B5EF4-FFF2-40B4-BE49-F238E27FC236}">
-                <a16:creationId xmlns:a16="http://schemas.microsoft.com/office/drawing/2014/main" id="{F7DA2B2B-FB66-4635-BC2A-F3A105AB74FC}"/>
-              </a:ext>
-            </a:extLst>
-          </p:cNvPr>
-          <p:cNvPicPr>
-            <a:picLocks noChangeAspect="1"/>
-          </p:cNvPicPr>
-          <p:nvPr/>
-        </p:nvPicPr>
-        <p:blipFill>
-          <a:blip r:embed="rId6">
-            <a:extLst>
-              <a:ext uri="{28A0092B-C50C-407E-A947-70E740481C1C}">
-                <a14:useLocalDpi xmlns:a14="http://schemas.microsoft.com/office/drawing/2010/main" val="0"/>
-              </a:ext>
-            </a:extLst>
-          </a:blip>
-          <a:stretch>
-            <a:fillRect/>
-          </a:stretch>
-        </p:blipFill>
-        <p:spPr>
-          <a:xfrm>
-            <a:off x="5824580" y="4998156"/>
-            <a:ext cx="1294456" cy="1294456"/>
-          </a:xfrm>
-          <a:prstGeom prst="rect">
-            <a:avLst/>
-          </a:prstGeom>
-        </p:spPr>
-      </p:pic>
-      <p:pic>
-        <p:nvPicPr>
-          <p:cNvPr id="20" name="Image 19">
-            <a:extLst>
-              <a:ext uri="{FF2B5EF4-FFF2-40B4-BE49-F238E27FC236}">
-                <a16:creationId xmlns:a16="http://schemas.microsoft.com/office/drawing/2014/main" id="{F5D8B23B-216B-4F1D-B833-9E0B5CCF6430}"/>
-              </a:ext>
-            </a:extLst>
-          </p:cNvPr>
-          <p:cNvPicPr>
-            <a:picLocks noChangeAspect="1"/>
-          </p:cNvPicPr>
-          <p:nvPr/>
-        </p:nvPicPr>
-        <p:blipFill>
-          <a:blip r:embed="rId2">
-            <a:extLst>
-              <a:ext uri="{28A0092B-C50C-407E-A947-70E740481C1C}">
-                <a14:useLocalDpi xmlns:a14="http://schemas.microsoft.com/office/drawing/2010/main" val="0"/>
-              </a:ext>
-            </a:extLst>
-          </a:blip>
-          <a:stretch>
-            <a:fillRect/>
-          </a:stretch>
-        </p:blipFill>
-        <p:spPr>
-          <a:xfrm>
-            <a:off x="8013445" y="3033823"/>
-            <a:ext cx="3646714" cy="3646714"/>
-          </a:xfrm>
-          <a:prstGeom prst="rect">
-            <a:avLst/>
-          </a:prstGeom>
-        </p:spPr>
-      </p:pic>
-      <p:pic>
-        <p:nvPicPr>
-          <p:cNvPr id="22" name="Image 21">
-            <a:extLst>
-              <a:ext uri="{FF2B5EF4-FFF2-40B4-BE49-F238E27FC236}">
-                <a16:creationId xmlns:a16="http://schemas.microsoft.com/office/drawing/2014/main" id="{E38B995C-D864-4FA0-B50A-79A0B55820FD}"/>
-              </a:ext>
-            </a:extLst>
-          </p:cNvPr>
-          <p:cNvPicPr>
-            <a:picLocks noChangeAspect="1"/>
-          </p:cNvPicPr>
-          <p:nvPr/>
-        </p:nvPicPr>
-        <p:blipFill>
-          <a:blip r:embed="rId7">
-            <a:extLst>
-              <a:ext uri="{28A0092B-C50C-407E-A947-70E740481C1C}">
-                <a14:useLocalDpi xmlns:a14="http://schemas.microsoft.com/office/drawing/2010/main" val="0"/>
-              </a:ext>
-            </a:extLst>
-          </a:blip>
-          <a:stretch>
-            <a:fillRect/>
-          </a:stretch>
-        </p:blipFill>
-        <p:spPr>
-          <a:xfrm>
-            <a:off x="10690449" y="91864"/>
-            <a:ext cx="1269841" cy="1269841"/>
-          </a:xfrm>
-          <a:prstGeom prst="rect">
-            <a:avLst/>
-          </a:prstGeom>
-        </p:spPr>
-      </p:pic>
-      <p:pic>
-        <p:nvPicPr>
-          <p:cNvPr id="24" name="Image 23">
-            <a:extLst>
-              <a:ext uri="{FF2B5EF4-FFF2-40B4-BE49-F238E27FC236}">
-                <a16:creationId xmlns:a16="http://schemas.microsoft.com/office/drawing/2014/main" id="{60CD9D4C-352D-4CED-8BE4-6A1C68DA6986}"/>
-              </a:ext>
-            </a:extLst>
-          </p:cNvPr>
-          <p:cNvPicPr>
-            <a:picLocks noChangeAspect="1"/>
-          </p:cNvPicPr>
-          <p:nvPr/>
-        </p:nvPicPr>
-        <p:blipFill>
-          <a:blip r:embed="rId8">
-            <a:extLst>
-              <a:ext uri="{28A0092B-C50C-407E-A947-70E740481C1C}">
-                <a14:useLocalDpi xmlns:a14="http://schemas.microsoft.com/office/drawing/2010/main" val="0"/>
-              </a:ext>
-            </a:extLst>
-          </a:blip>
-          <a:stretch>
-            <a:fillRect/>
-          </a:stretch>
-        </p:blipFill>
-        <p:spPr>
-          <a:xfrm>
-            <a:off x="9578162" y="4728547"/>
-            <a:ext cx="1564065" cy="1564065"/>
-          </a:xfrm>
-          <a:prstGeom prst="rect">
-            <a:avLst/>
-          </a:prstGeom>
-        </p:spPr>
-      </p:pic>
-      <p:sp>
-        <p:nvSpPr>
-          <p:cNvPr id="28" name="Rectangle 27">
-            <a:extLst>
-              <a:ext uri="{FF2B5EF4-FFF2-40B4-BE49-F238E27FC236}">
-                <a16:creationId xmlns:a16="http://schemas.microsoft.com/office/drawing/2014/main" id="{6F816FDF-6FD8-48C5-BD8C-FEAB9AD95B97}"/>
-              </a:ext>
-            </a:extLst>
-          </p:cNvPr>
-          <p:cNvSpPr/>
-          <p:nvPr/>
-        </p:nvSpPr>
-        <p:spPr>
-          <a:xfrm>
-            <a:off x="4567269" y="3724062"/>
-            <a:ext cx="2664000" cy="2664000"/>
-          </a:xfrm>
-          <a:prstGeom prst="rect">
-            <a:avLst/>
-          </a:prstGeom>
           <a:noFill/>
         </p:spPr>
-        <p:style>
-          <a:lnRef idx="2">
-            <a:schemeClr val="accent1">
-              <a:shade val="50000"/>
-            </a:schemeClr>
-          </a:lnRef>
-          <a:fillRef idx="1">
-            <a:schemeClr val="accent1"/>
-          </a:fillRef>
-          <a:effectRef idx="0">
-            <a:schemeClr val="accent1"/>
-          </a:effectRef>
-          <a:fontRef idx="minor">
-            <a:schemeClr val="lt1"/>
-          </a:fontRef>
-        </p:style>
-        <p:txBody>
-          <a:bodyPr rtlCol="0" anchor="ctr"/>
-          <a:lstStyle/>
-          <a:p>
-            <a:pPr algn="ctr"/>
-            <a:endParaRPr lang="fr-FR"/>
+        <p:txBody>
+          <a:bodyPr wrap="square" lIns="0" tIns="0" rIns="0" bIns="0" rtlCol="0">
+            <a:spAutoFit/>
+          </a:bodyPr>
+          <a:lstStyle/>
+          <a:p>
+            <a:r>
+              <a:rPr lang="fr-FR" sz="3600" b="1" dirty="0">
+                <a:solidFill>
+                  <a:srgbClr val="C00000"/>
+                </a:solidFill>
+                <a:latin typeface="Tahoma" panose="020B0604030504040204" pitchFamily="34" charset="0"/>
+                <a:ea typeface="Tahoma" panose="020B0604030504040204" pitchFamily="34" charset="0"/>
+                <a:cs typeface="Tahoma" panose="020B0604030504040204" pitchFamily="34" charset="0"/>
+              </a:rPr>
+              <a:t>VM</a:t>
+            </a:r>
           </a:p>
         </p:txBody>
       </p:sp>
     </p:spTree>
     <p:extLst>
       <p:ext uri="{BB962C8B-B14F-4D97-AF65-F5344CB8AC3E}">
-        <p14:creationId xmlns:p14="http://schemas.microsoft.com/office/powerpoint/2010/main" val="1346175183"/>
+        <p14:creationId xmlns:p14="http://schemas.microsoft.com/office/powerpoint/2010/main" val="1687480670"/>
       </p:ext>
     </p:extLst>
   </p:cSld>
@@ -4062,10 +3697,10 @@
       </p:grpSpPr>
       <p:pic>
         <p:nvPicPr>
-          <p:cNvPr id="18" name="Image 17">
-            <a:extLst>
-              <a:ext uri="{FF2B5EF4-FFF2-40B4-BE49-F238E27FC236}">
-                <a16:creationId xmlns:a16="http://schemas.microsoft.com/office/drawing/2014/main" id="{43084D84-B1D0-4117-B9F9-F3DB60FB20BC}"/>
+          <p:cNvPr id="5" name="Image 4">
+            <a:extLst>
+              <a:ext uri="{FF2B5EF4-FFF2-40B4-BE49-F238E27FC236}">
+                <a16:creationId xmlns:a16="http://schemas.microsoft.com/office/drawing/2014/main" id="{C345F049-F309-4CC2-9648-D43C4DD6D690}"/>
               </a:ext>
             </a:extLst>
           </p:cNvPr>
@@ -4088,7 +3723,7 @@
         </p:blipFill>
         <p:spPr>
           <a:xfrm>
-            <a:off x="4613705" y="380995"/>
+            <a:off x="1278293" y="826908"/>
             <a:ext cx="3646714" cy="3646714"/>
           </a:xfrm>
           <a:prstGeom prst="rect">
@@ -4098,10 +3733,10 @@
       </p:pic>
       <p:pic>
         <p:nvPicPr>
-          <p:cNvPr id="17" name="Image 16">
-            <a:extLst>
-              <a:ext uri="{FF2B5EF4-FFF2-40B4-BE49-F238E27FC236}">
-                <a16:creationId xmlns:a16="http://schemas.microsoft.com/office/drawing/2014/main" id="{C6BBBFE9-BD27-4A74-AAB9-4C3A1BE7EB71}"/>
+          <p:cNvPr id="12" name="Image 11">
+            <a:extLst>
+              <a:ext uri="{FF2B5EF4-FFF2-40B4-BE49-F238E27FC236}">
+                <a16:creationId xmlns:a16="http://schemas.microsoft.com/office/drawing/2014/main" id="{F13140DB-EFE9-41B3-A3FB-47A369E00783}"/>
               </a:ext>
             </a:extLst>
           </p:cNvPr>
@@ -4124,7 +3759,7 @@
         </p:blipFill>
         <p:spPr>
           <a:xfrm>
-            <a:off x="213407" y="439354"/>
+            <a:off x="7768545" y="826909"/>
             <a:ext cx="3646714" cy="3646714"/>
           </a:xfrm>
           <a:prstGeom prst="rect">
@@ -4132,12 +3767,312 @@
           </a:prstGeom>
         </p:spPr>
       </p:pic>
-      <p:sp>
-        <p:nvSpPr>
-          <p:cNvPr id="28" name="Rectangle 27">
-            <a:extLst>
-              <a:ext uri="{FF2B5EF4-FFF2-40B4-BE49-F238E27FC236}">
-                <a16:creationId xmlns:a16="http://schemas.microsoft.com/office/drawing/2014/main" id="{6F816FDF-6FD8-48C5-BD8C-FEAB9AD95B97}"/>
+      <p:pic>
+        <p:nvPicPr>
+          <p:cNvPr id="13" name="Image 12">
+            <a:extLst>
+              <a:ext uri="{FF2B5EF4-FFF2-40B4-BE49-F238E27FC236}">
+                <a16:creationId xmlns:a16="http://schemas.microsoft.com/office/drawing/2014/main" id="{206D1DE1-567B-4A7F-B899-6D63D483A7E6}"/>
+              </a:ext>
+            </a:extLst>
+          </p:cNvPr>
+          <p:cNvPicPr>
+            <a:picLocks noChangeAspect="1"/>
+          </p:cNvPicPr>
+          <p:nvPr/>
+        </p:nvPicPr>
+        <p:blipFill>
+          <a:blip r:embed="rId3">
+            <a:extLst>
+              <a:ext uri="{28A0092B-C50C-407E-A947-70E740481C1C}">
+                <a14:useLocalDpi xmlns:a14="http://schemas.microsoft.com/office/drawing/2010/main" val="0"/>
+              </a:ext>
+            </a:extLst>
+          </a:blip>
+          <a:stretch>
+            <a:fillRect/>
+          </a:stretch>
+        </p:blipFill>
+        <p:spPr>
+          <a:xfrm>
+            <a:off x="9416604" y="2385830"/>
+            <a:ext cx="1881924" cy="1881924"/>
+          </a:xfrm>
+          <a:prstGeom prst="rect">
+            <a:avLst/>
+          </a:prstGeom>
+        </p:spPr>
+      </p:pic>
+      <p:sp>
+        <p:nvSpPr>
+          <p:cNvPr id="15" name="ZoneTexte 14">
+            <a:extLst>
+              <a:ext uri="{FF2B5EF4-FFF2-40B4-BE49-F238E27FC236}">
+                <a16:creationId xmlns:a16="http://schemas.microsoft.com/office/drawing/2014/main" id="{2AD91442-5EAC-4FCF-995C-69CD44614948}"/>
+              </a:ext>
+            </a:extLst>
+          </p:cNvPr>
+          <p:cNvSpPr txBox="1"/>
+          <p:nvPr/>
+        </p:nvSpPr>
+        <p:spPr>
+          <a:xfrm>
+            <a:off x="9754385" y="2510111"/>
+            <a:ext cx="720000" cy="553998"/>
+          </a:xfrm>
+          <a:prstGeom prst="rect">
+            <a:avLst/>
+          </a:prstGeom>
+          <a:noFill/>
+        </p:spPr>
+        <p:txBody>
+          <a:bodyPr wrap="square" lIns="0" tIns="0" rIns="0" bIns="0" rtlCol="0">
+            <a:spAutoFit/>
+          </a:bodyPr>
+          <a:lstStyle/>
+          <a:p>
+            <a:r>
+              <a:rPr lang="fr-FR" sz="3600" b="1" dirty="0">
+                <a:solidFill>
+                  <a:srgbClr val="C00000"/>
+                </a:solidFill>
+                <a:latin typeface="Tahoma" panose="020B0604030504040204" pitchFamily="34" charset="0"/>
+                <a:ea typeface="Tahoma" panose="020B0604030504040204" pitchFamily="34" charset="0"/>
+                <a:cs typeface="Tahoma" panose="020B0604030504040204" pitchFamily="34" charset="0"/>
+              </a:rPr>
+              <a:t>VM</a:t>
+            </a:r>
+          </a:p>
+        </p:txBody>
+      </p:sp>
+      <p:cxnSp>
+        <p:nvCxnSpPr>
+          <p:cNvPr id="8" name="Connecteur droit 7">
+            <a:extLst>
+              <a:ext uri="{FF2B5EF4-FFF2-40B4-BE49-F238E27FC236}">
+                <a16:creationId xmlns:a16="http://schemas.microsoft.com/office/drawing/2014/main" id="{11FD8655-C629-47C4-8F4E-C363B062BAB3}"/>
+              </a:ext>
+            </a:extLst>
+          </p:cNvPr>
+          <p:cNvCxnSpPr/>
+          <p:nvPr/>
+        </p:nvCxnSpPr>
+        <p:spPr>
+          <a:xfrm>
+            <a:off x="330530" y="626163"/>
+            <a:ext cx="10967998" cy="0"/>
+          </a:xfrm>
+          <a:prstGeom prst="line">
+            <a:avLst/>
+          </a:prstGeom>
+        </p:spPr>
+        <p:style>
+          <a:lnRef idx="1">
+            <a:schemeClr val="accent1"/>
+          </a:lnRef>
+          <a:fillRef idx="0">
+            <a:schemeClr val="accent1"/>
+          </a:fillRef>
+          <a:effectRef idx="0">
+            <a:schemeClr val="accent1"/>
+          </a:effectRef>
+          <a:fontRef idx="minor">
+            <a:schemeClr val="tx1"/>
+          </a:fontRef>
+        </p:style>
+      </p:cxnSp>
+      <p:cxnSp>
+        <p:nvCxnSpPr>
+          <p:cNvPr id="19" name="Connecteur droit 18">
+            <a:extLst>
+              <a:ext uri="{FF2B5EF4-FFF2-40B4-BE49-F238E27FC236}">
+                <a16:creationId xmlns:a16="http://schemas.microsoft.com/office/drawing/2014/main" id="{1728A727-2C08-4F90-888F-264242D10B38}"/>
+              </a:ext>
+            </a:extLst>
+          </p:cNvPr>
+          <p:cNvCxnSpPr/>
+          <p:nvPr/>
+        </p:nvCxnSpPr>
+        <p:spPr>
+          <a:xfrm>
+            <a:off x="447261" y="5180423"/>
+            <a:ext cx="10967998" cy="0"/>
+          </a:xfrm>
+          <a:prstGeom prst="line">
+            <a:avLst/>
+          </a:prstGeom>
+        </p:spPr>
+        <p:style>
+          <a:lnRef idx="1">
+            <a:schemeClr val="accent1"/>
+          </a:lnRef>
+          <a:fillRef idx="0">
+            <a:schemeClr val="accent1"/>
+          </a:fillRef>
+          <a:effectRef idx="0">
+            <a:schemeClr val="accent1"/>
+          </a:effectRef>
+          <a:fontRef idx="minor">
+            <a:schemeClr val="tx1"/>
+          </a:fontRef>
+        </p:style>
+      </p:cxnSp>
+      <p:pic>
+        <p:nvPicPr>
+          <p:cNvPr id="20" name="Image 19" descr="Une image contenant signe&#10;&#10;Description générée automatiquement">
+            <a:extLst>
+              <a:ext uri="{FF2B5EF4-FFF2-40B4-BE49-F238E27FC236}">
+                <a16:creationId xmlns:a16="http://schemas.microsoft.com/office/drawing/2014/main" id="{C1B875C7-14C0-411F-8339-E742589FD1E8}"/>
+              </a:ext>
+            </a:extLst>
+          </p:cNvPr>
+          <p:cNvPicPr>
+            <a:picLocks noChangeAspect="1"/>
+          </p:cNvPicPr>
+          <p:nvPr/>
+        </p:nvPicPr>
+        <p:blipFill>
+          <a:blip r:embed="rId4">
+            <a:extLst>
+              <a:ext uri="{28A0092B-C50C-407E-A947-70E740481C1C}">
+                <a14:useLocalDpi xmlns:a14="http://schemas.microsoft.com/office/drawing/2010/main" val="0"/>
+              </a:ext>
+            </a:extLst>
+          </a:blip>
+          <a:stretch>
+            <a:fillRect/>
+          </a:stretch>
+        </p:blipFill>
+        <p:spPr>
+          <a:xfrm>
+            <a:off x="2882348" y="2565421"/>
+            <a:ext cx="1881924" cy="1574137"/>
+          </a:xfrm>
+          <a:prstGeom prst="rect">
+            <a:avLst/>
+          </a:prstGeom>
+        </p:spPr>
+      </p:pic>
+      <p:pic>
+        <p:nvPicPr>
+          <p:cNvPr id="3" name="Image 2">
+            <a:extLst>
+              <a:ext uri="{FF2B5EF4-FFF2-40B4-BE49-F238E27FC236}">
+                <a16:creationId xmlns:a16="http://schemas.microsoft.com/office/drawing/2014/main" id="{FB0D2A93-7050-474F-9441-43A920D509B1}"/>
+              </a:ext>
+            </a:extLst>
+          </p:cNvPr>
+          <p:cNvPicPr>
+            <a:picLocks noChangeAspect="1"/>
+          </p:cNvPicPr>
+          <p:nvPr/>
+        </p:nvPicPr>
+        <p:blipFill>
+          <a:blip r:embed="rId5">
+            <a:extLst>
+              <a:ext uri="{28A0092B-C50C-407E-A947-70E740481C1C}">
+                <a14:useLocalDpi xmlns:a14="http://schemas.microsoft.com/office/drawing/2010/main" val="0"/>
+              </a:ext>
+            </a:extLst>
+          </a:blip>
+          <a:stretch>
+            <a:fillRect/>
+          </a:stretch>
+        </p:blipFill>
+        <p:spPr>
+          <a:xfrm>
+            <a:off x="5357250" y="5426122"/>
+            <a:ext cx="1295227" cy="1295227"/>
+          </a:xfrm>
+          <a:prstGeom prst="rect">
+            <a:avLst/>
+          </a:prstGeom>
+        </p:spPr>
+      </p:pic>
+      <p:cxnSp>
+        <p:nvCxnSpPr>
+          <p:cNvPr id="24" name="Connecteur droit 23">
+            <a:extLst>
+              <a:ext uri="{FF2B5EF4-FFF2-40B4-BE49-F238E27FC236}">
+                <a16:creationId xmlns:a16="http://schemas.microsoft.com/office/drawing/2014/main" id="{D135F6A7-2FF2-432E-B547-ED60335EA693}"/>
+              </a:ext>
+            </a:extLst>
+          </p:cNvPr>
+          <p:cNvCxnSpPr>
+            <a:cxnSpLocks/>
+          </p:cNvCxnSpPr>
+          <p:nvPr/>
+        </p:nvCxnSpPr>
+        <p:spPr>
+          <a:xfrm>
+            <a:off x="3593591" y="2968415"/>
+            <a:ext cx="0" cy="745190"/>
+          </a:xfrm>
+          <a:prstGeom prst="line">
+            <a:avLst/>
+          </a:prstGeom>
+          <a:ln w="38100"/>
+        </p:spPr>
+        <p:style>
+          <a:lnRef idx="1">
+            <a:schemeClr val="accent1"/>
+          </a:lnRef>
+          <a:fillRef idx="0">
+            <a:schemeClr val="accent1"/>
+          </a:fillRef>
+          <a:effectRef idx="0">
+            <a:schemeClr val="accent1"/>
+          </a:effectRef>
+          <a:fontRef idx="minor">
+            <a:schemeClr val="tx1"/>
+          </a:fontRef>
+        </p:style>
+      </p:cxnSp>
+      <p:cxnSp>
+        <p:nvCxnSpPr>
+          <p:cNvPr id="26" name="Connecteur droit 25">
+            <a:extLst>
+              <a:ext uri="{FF2B5EF4-FFF2-40B4-BE49-F238E27FC236}">
+                <a16:creationId xmlns:a16="http://schemas.microsoft.com/office/drawing/2014/main" id="{4D4A3AFA-466B-423E-B1A9-499DDFF8C998}"/>
+              </a:ext>
+            </a:extLst>
+          </p:cNvPr>
+          <p:cNvCxnSpPr>
+            <a:cxnSpLocks/>
+          </p:cNvCxnSpPr>
+          <p:nvPr/>
+        </p:nvCxnSpPr>
+        <p:spPr>
+          <a:xfrm flipV="1">
+            <a:off x="4099468" y="2896378"/>
+            <a:ext cx="0" cy="299720"/>
+          </a:xfrm>
+          <a:prstGeom prst="line">
+            <a:avLst/>
+          </a:prstGeom>
+          <a:ln w="38100"/>
+        </p:spPr>
+        <p:style>
+          <a:lnRef idx="1">
+            <a:schemeClr val="accent1"/>
+          </a:lnRef>
+          <a:fillRef idx="0">
+            <a:schemeClr val="accent1"/>
+          </a:fillRef>
+          <a:effectRef idx="0">
+            <a:schemeClr val="accent1"/>
+          </a:effectRef>
+          <a:fontRef idx="minor">
+            <a:schemeClr val="tx1"/>
+          </a:fontRef>
+        </p:style>
+      </p:cxnSp>
+      <p:sp>
+        <p:nvSpPr>
+          <p:cNvPr id="21" name="Rectangle : coins arrondis 20">
+            <a:extLst>
+              <a:ext uri="{FF2B5EF4-FFF2-40B4-BE49-F238E27FC236}">
+                <a16:creationId xmlns:a16="http://schemas.microsoft.com/office/drawing/2014/main" id="{1683D430-14FF-48B4-B944-472C33833B8F}"/>
               </a:ext>
             </a:extLst>
           </p:cNvPr>
@@ -4146,13 +4081,19 @@
         </p:nvSpPr>
         <p:spPr>
           <a:xfrm>
-            <a:off x="725365" y="1020225"/>
-            <a:ext cx="2664000" cy="2664000"/>
-          </a:xfrm>
-          <a:prstGeom prst="rect">
-            <a:avLst/>
-          </a:prstGeom>
-          <a:noFill/>
+            <a:off x="3290871" y="3613874"/>
+            <a:ext cx="532439" cy="360226"/>
+          </a:xfrm>
+          <a:prstGeom prst="roundRect">
+            <a:avLst/>
+          </a:prstGeom>
+          <a:solidFill>
+            <a:schemeClr val="accent1">
+              <a:lumMod val="40000"/>
+              <a:lumOff val="60000"/>
+            </a:schemeClr>
+          </a:solidFill>
+          <a:ln w="38100"/>
         </p:spPr>
         <p:style>
           <a:lnRef idx="2">
@@ -4175,88 +4116,16 @@
           <a:lstStyle/>
           <a:p>
             <a:pPr algn="ctr"/>
-            <a:endParaRPr lang="fr-FR"/>
-          </a:p>
-        </p:txBody>
-      </p:sp>
-      <p:pic>
-        <p:nvPicPr>
-          <p:cNvPr id="4" name="Image 3">
-            <a:extLst>
-              <a:ext uri="{FF2B5EF4-FFF2-40B4-BE49-F238E27FC236}">
-                <a16:creationId xmlns:a16="http://schemas.microsoft.com/office/drawing/2014/main" id="{013456DC-8382-4B6A-9F3F-AE50BC3533C5}"/>
-              </a:ext>
-            </a:extLst>
-          </p:cNvPr>
-          <p:cNvPicPr>
-            <a:picLocks noChangeAspect="1"/>
-          </p:cNvPicPr>
-          <p:nvPr/>
-        </p:nvPicPr>
-        <p:blipFill>
-          <a:blip r:embed="rId3">
-            <a:extLst>
-              <a:ext uri="{28A0092B-C50C-407E-A947-70E740481C1C}">
-                <a14:useLocalDpi xmlns:a14="http://schemas.microsoft.com/office/drawing/2010/main" val="0"/>
-              </a:ext>
-            </a:extLst>
-          </a:blip>
-          <a:stretch>
-            <a:fillRect/>
-          </a:stretch>
-        </p:blipFill>
-        <p:spPr>
-          <a:xfrm>
-            <a:off x="6616201" y="2291572"/>
-            <a:ext cx="1021581" cy="1323661"/>
-          </a:xfrm>
-          <a:prstGeom prst="rect">
-            <a:avLst/>
-          </a:prstGeom>
-        </p:spPr>
-      </p:pic>
-      <p:pic>
-        <p:nvPicPr>
-          <p:cNvPr id="7" name="Image 6">
-            <a:extLst>
-              <a:ext uri="{FF2B5EF4-FFF2-40B4-BE49-F238E27FC236}">
-                <a16:creationId xmlns:a16="http://schemas.microsoft.com/office/drawing/2014/main" id="{9B141743-14F6-4479-A189-A58B64814193}"/>
-              </a:ext>
-            </a:extLst>
-          </p:cNvPr>
-          <p:cNvPicPr>
-            <a:picLocks noChangeAspect="1"/>
-          </p:cNvPicPr>
-          <p:nvPr/>
-        </p:nvPicPr>
-        <p:blipFill>
-          <a:blip r:embed="rId4">
-            <a:extLst>
-              <a:ext uri="{28A0092B-C50C-407E-A947-70E740481C1C}">
-                <a14:useLocalDpi xmlns:a14="http://schemas.microsoft.com/office/drawing/2010/main" val="0"/>
-              </a:ext>
-            </a:extLst>
-          </a:blip>
-          <a:stretch>
-            <a:fillRect/>
-          </a:stretch>
-        </p:blipFill>
-        <p:spPr>
-          <a:xfrm>
-            <a:off x="1931978" y="2291572"/>
-            <a:ext cx="1371197" cy="1371197"/>
-          </a:xfrm>
-          <a:prstGeom prst="rect">
-            <a:avLst/>
-          </a:prstGeom>
-        </p:spPr>
-      </p:pic>
-      <p:sp>
-        <p:nvSpPr>
-          <p:cNvPr id="21" name="Rectangle 20">
-            <a:extLst>
-              <a:ext uri="{FF2B5EF4-FFF2-40B4-BE49-F238E27FC236}">
-                <a16:creationId xmlns:a16="http://schemas.microsoft.com/office/drawing/2014/main" id="{DA5C6D22-45F9-4F2D-9F45-E4DF9B556072}"/>
+            <a:endParaRPr lang="en-US"/>
+          </a:p>
+        </p:txBody>
+      </p:sp>
+      <p:sp>
+        <p:nvSpPr>
+          <p:cNvPr id="22" name="Rectangle : coins arrondis 21">
+            <a:extLst>
+              <a:ext uri="{FF2B5EF4-FFF2-40B4-BE49-F238E27FC236}">
+                <a16:creationId xmlns:a16="http://schemas.microsoft.com/office/drawing/2014/main" id="{362CC9FF-9303-4A8A-B8CB-222CB0C503E2}"/>
               </a:ext>
             </a:extLst>
           </p:cNvPr>
@@ -4265,13 +4134,19 @@
         </p:nvSpPr>
         <p:spPr>
           <a:xfrm>
-            <a:off x="5125663" y="951233"/>
-            <a:ext cx="2664000" cy="2664000"/>
-          </a:xfrm>
-          <a:prstGeom prst="rect">
-            <a:avLst/>
-          </a:prstGeom>
-          <a:noFill/>
+            <a:off x="3833249" y="3196098"/>
+            <a:ext cx="532439" cy="360226"/>
+          </a:xfrm>
+          <a:prstGeom prst="roundRect">
+            <a:avLst/>
+          </a:prstGeom>
+          <a:solidFill>
+            <a:schemeClr val="accent2">
+              <a:lumMod val="40000"/>
+              <a:lumOff val="60000"/>
+            </a:schemeClr>
+          </a:solidFill>
+          <a:ln w="38100"/>
         </p:spPr>
         <p:style>
           <a:lnRef idx="2">
@@ -4294,88 +4169,55 @@
           <a:lstStyle/>
           <a:p>
             <a:pPr algn="ctr"/>
-            <a:endParaRPr lang="fr-FR"/>
-          </a:p>
-        </p:txBody>
-      </p:sp>
-      <p:pic>
-        <p:nvPicPr>
-          <p:cNvPr id="25" name="Image 24">
-            <a:extLst>
-              <a:ext uri="{FF2B5EF4-FFF2-40B4-BE49-F238E27FC236}">
-                <a16:creationId xmlns:a16="http://schemas.microsoft.com/office/drawing/2014/main" id="{8288545C-1664-4B43-8B18-8C2F5CBC988F}"/>
-              </a:ext>
-            </a:extLst>
-          </p:cNvPr>
-          <p:cNvPicPr>
-            <a:picLocks noChangeAspect="1"/>
-          </p:cNvPicPr>
+            <a:endParaRPr lang="en-US"/>
+          </a:p>
+        </p:txBody>
+      </p:sp>
+      <p:cxnSp>
+        <p:nvCxnSpPr>
+          <p:cNvPr id="35" name="Connecteur droit 34">
+            <a:extLst>
+              <a:ext uri="{FF2B5EF4-FFF2-40B4-BE49-F238E27FC236}">
+                <a16:creationId xmlns:a16="http://schemas.microsoft.com/office/drawing/2014/main" id="{F077E673-D93C-40E6-B446-AA5592B7C018}"/>
+              </a:ext>
+            </a:extLst>
+          </p:cNvPr>
+          <p:cNvCxnSpPr>
+            <a:cxnSpLocks/>
+          </p:cNvCxnSpPr>
           <p:nvPr/>
-        </p:nvPicPr>
-        <p:blipFill>
-          <a:blip r:embed="rId2">
-            <a:extLst>
-              <a:ext uri="{28A0092B-C50C-407E-A947-70E740481C1C}">
-                <a14:useLocalDpi xmlns:a14="http://schemas.microsoft.com/office/drawing/2010/main" val="0"/>
-              </a:ext>
-            </a:extLst>
-          </a:blip>
-          <a:stretch>
-            <a:fillRect/>
-          </a:stretch>
-        </p:blipFill>
-        <p:spPr>
-          <a:xfrm>
-            <a:off x="7965884" y="2666994"/>
-            <a:ext cx="3646714" cy="3646714"/>
-          </a:xfrm>
-          <a:prstGeom prst="rect">
-            <a:avLst/>
-          </a:prstGeom>
-        </p:spPr>
-      </p:pic>
-      <p:pic>
-        <p:nvPicPr>
-          <p:cNvPr id="26" name="Image 25">
-            <a:extLst>
-              <a:ext uri="{FF2B5EF4-FFF2-40B4-BE49-F238E27FC236}">
-                <a16:creationId xmlns:a16="http://schemas.microsoft.com/office/drawing/2014/main" id="{B1EE590B-894E-492E-9D02-0430CF0AB675}"/>
-              </a:ext>
-            </a:extLst>
-          </p:cNvPr>
-          <p:cNvPicPr>
-            <a:picLocks noChangeAspect="1"/>
-          </p:cNvPicPr>
-          <p:nvPr/>
-        </p:nvPicPr>
-        <p:blipFill>
-          <a:blip r:embed="rId3">
-            <a:extLst>
-              <a:ext uri="{28A0092B-C50C-407E-A947-70E740481C1C}">
-                <a14:useLocalDpi xmlns:a14="http://schemas.microsoft.com/office/drawing/2010/main" val="0"/>
-              </a:ext>
-            </a:extLst>
-          </a:blip>
-          <a:stretch>
-            <a:fillRect/>
-          </a:stretch>
-        </p:blipFill>
-        <p:spPr>
-          <a:xfrm>
-            <a:off x="9718159" y="4557849"/>
-            <a:ext cx="1318436" cy="1708296"/>
-          </a:xfrm>
-          <a:prstGeom prst="rect">
-            <a:avLst/>
-          </a:prstGeom>
-        </p:spPr>
-      </p:pic>
-      <p:sp>
-        <p:nvSpPr>
-          <p:cNvPr id="27" name="Rectangle 26">
-            <a:extLst>
-              <a:ext uri="{FF2B5EF4-FFF2-40B4-BE49-F238E27FC236}">
-                <a16:creationId xmlns:a16="http://schemas.microsoft.com/office/drawing/2014/main" id="{A5AB5D0F-C15A-47C8-838D-CC88FDB07200}"/>
+        </p:nvCxnSpPr>
+        <p:spPr>
+          <a:xfrm flipH="1">
+            <a:off x="3708867" y="2916256"/>
+            <a:ext cx="390601" cy="0"/>
+          </a:xfrm>
+          <a:prstGeom prst="line">
+            <a:avLst/>
+          </a:prstGeom>
+          <a:ln w="38100"/>
+        </p:spPr>
+        <p:style>
+          <a:lnRef idx="1">
+            <a:schemeClr val="accent1"/>
+          </a:lnRef>
+          <a:fillRef idx="0">
+            <a:schemeClr val="accent1"/>
+          </a:fillRef>
+          <a:effectRef idx="0">
+            <a:schemeClr val="accent1"/>
+          </a:effectRef>
+          <a:fontRef idx="minor">
+            <a:schemeClr val="tx1"/>
+          </a:fontRef>
+        </p:style>
+      </p:cxnSp>
+      <p:sp>
+        <p:nvSpPr>
+          <p:cNvPr id="6" name="Rectangle : coins arrondis 5">
+            <a:extLst>
+              <a:ext uri="{FF2B5EF4-FFF2-40B4-BE49-F238E27FC236}">
+                <a16:creationId xmlns:a16="http://schemas.microsoft.com/office/drawing/2014/main" id="{C7A26CF8-018A-42C8-BE04-EDA003565A7B}"/>
               </a:ext>
             </a:extLst>
           </p:cNvPr>
@@ -4384,13 +4226,19 @@
         </p:nvSpPr>
         <p:spPr>
           <a:xfrm>
-            <a:off x="8477842" y="3237232"/>
-            <a:ext cx="2664000" cy="2664000"/>
-          </a:xfrm>
-          <a:prstGeom prst="rect">
-            <a:avLst/>
-          </a:prstGeom>
-          <a:noFill/>
+            <a:off x="3327372" y="2719574"/>
+            <a:ext cx="532439" cy="360226"/>
+          </a:xfrm>
+          <a:prstGeom prst="roundRect">
+            <a:avLst/>
+          </a:prstGeom>
+          <a:solidFill>
+            <a:schemeClr val="accent4">
+              <a:lumMod val="40000"/>
+              <a:lumOff val="60000"/>
+            </a:schemeClr>
+          </a:solidFill>
+          <a:ln w="38100"/>
         </p:spPr>
         <p:style>
           <a:lnRef idx="2">
@@ -4413,16 +4261,16 @@
           <a:lstStyle/>
           <a:p>
             <a:pPr algn="ctr"/>
-            <a:endParaRPr lang="fr-FR"/>
-          </a:p>
-        </p:txBody>
-      </p:sp>
-      <p:sp>
-        <p:nvSpPr>
-          <p:cNvPr id="9" name="Rectangle 8">
-            <a:extLst>
-              <a:ext uri="{FF2B5EF4-FFF2-40B4-BE49-F238E27FC236}">
-                <a16:creationId xmlns:a16="http://schemas.microsoft.com/office/drawing/2014/main" id="{E045FF58-BF0C-4FBB-A83E-24EA950E8943}"/>
+            <a:endParaRPr lang="en-US"/>
+          </a:p>
+        </p:txBody>
+      </p:sp>
+      <p:sp>
+        <p:nvSpPr>
+          <p:cNvPr id="40" name="Rectangle 39">
+            <a:extLst>
+              <a:ext uri="{FF2B5EF4-FFF2-40B4-BE49-F238E27FC236}">
+                <a16:creationId xmlns:a16="http://schemas.microsoft.com/office/drawing/2014/main" id="{9E3E7D4D-7743-4195-A116-5D2991D7D914}"/>
               </a:ext>
             </a:extLst>
           </p:cNvPr>
@@ -4431,18 +4279,13 @@
         </p:nvSpPr>
         <p:spPr>
           <a:xfrm>
-            <a:off x="9462977" y="5825707"/>
-            <a:ext cx="1573618" cy="563526"/>
+            <a:off x="1838036" y="1487055"/>
+            <a:ext cx="2715491" cy="2652504"/>
           </a:xfrm>
           <a:prstGeom prst="rect">
             <a:avLst/>
           </a:prstGeom>
-          <a:solidFill>
-            <a:schemeClr val="bg1"/>
-          </a:solidFill>
-          <a:ln>
-            <a:noFill/>
-          </a:ln>
+          <a:noFill/>
         </p:spPr>
         <p:style>
           <a:lnRef idx="2">
@@ -4465,6 +4308,918 @@
           <a:lstStyle/>
           <a:p>
             <a:pPr algn="ctr"/>
+            <a:endParaRPr lang="en-US"/>
+          </a:p>
+        </p:txBody>
+      </p:sp>
+    </p:spTree>
+    <p:extLst>
+      <p:ext uri="{BB962C8B-B14F-4D97-AF65-F5344CB8AC3E}">
+        <p14:creationId xmlns:p14="http://schemas.microsoft.com/office/powerpoint/2010/main" val="2684163096"/>
+      </p:ext>
+    </p:extLst>
+  </p:cSld>
+  <p:clrMapOvr>
+    <a:masterClrMapping/>
+  </p:clrMapOvr>
+</p:sld>
+</file>
+
+<file path=ppt/slides/slide4.xml><?xml version="1.0" encoding="utf-8"?>
+<p:sld xmlns:a="http://schemas.openxmlformats.org/drawingml/2006/main" xmlns:r="http://schemas.openxmlformats.org/officeDocument/2006/relationships" xmlns:p="http://schemas.openxmlformats.org/presentationml/2006/main">
+  <p:cSld>
+    <p:spTree>
+      <p:nvGrpSpPr>
+        <p:cNvPr id="1" name=""/>
+        <p:cNvGrpSpPr/>
+        <p:nvPr/>
+      </p:nvGrpSpPr>
+      <p:grpSpPr>
+        <a:xfrm>
+          <a:off x="0" y="0"/>
+          <a:ext cx="0" cy="0"/>
+          <a:chOff x="0" y="0"/>
+          <a:chExt cx="0" cy="0"/>
+        </a:xfrm>
+      </p:grpSpPr>
+      <p:pic>
+        <p:nvPicPr>
+          <p:cNvPr id="13" name="Image 12">
+            <a:extLst>
+              <a:ext uri="{FF2B5EF4-FFF2-40B4-BE49-F238E27FC236}">
+                <a16:creationId xmlns:a16="http://schemas.microsoft.com/office/drawing/2014/main" id="{3306D9C5-1283-4BF1-B89D-BDB6A80B6C3F}"/>
+              </a:ext>
+            </a:extLst>
+          </p:cNvPr>
+          <p:cNvPicPr>
+            <a:picLocks noChangeAspect="1"/>
+          </p:cNvPicPr>
+          <p:nvPr/>
+        </p:nvPicPr>
+        <p:blipFill>
+          <a:blip r:embed="rId2">
+            <a:extLst>
+              <a:ext uri="{28A0092B-C50C-407E-A947-70E740481C1C}">
+                <a14:useLocalDpi xmlns:a14="http://schemas.microsoft.com/office/drawing/2010/main" val="0"/>
+              </a:ext>
+            </a:extLst>
+          </a:blip>
+          <a:stretch>
+            <a:fillRect/>
+          </a:stretch>
+        </p:blipFill>
+        <p:spPr>
+          <a:xfrm>
+            <a:off x="5549523" y="0"/>
+            <a:ext cx="3646714" cy="3646714"/>
+          </a:xfrm>
+          <a:prstGeom prst="rect">
+            <a:avLst/>
+          </a:prstGeom>
+        </p:spPr>
+      </p:pic>
+      <p:pic>
+        <p:nvPicPr>
+          <p:cNvPr id="8" name="Image 7">
+            <a:extLst>
+              <a:ext uri="{FF2B5EF4-FFF2-40B4-BE49-F238E27FC236}">
+                <a16:creationId xmlns:a16="http://schemas.microsoft.com/office/drawing/2014/main" id="{94484C4C-AA6C-4399-B64A-B4E71EA044B8}"/>
+              </a:ext>
+            </a:extLst>
+          </p:cNvPr>
+          <p:cNvPicPr>
+            <a:picLocks noChangeAspect="1"/>
+          </p:cNvPicPr>
+          <p:nvPr/>
+        </p:nvPicPr>
+        <p:blipFill>
+          <a:blip r:embed="rId2">
+            <a:extLst>
+              <a:ext uri="{28A0092B-C50C-407E-A947-70E740481C1C}">
+                <a14:useLocalDpi xmlns:a14="http://schemas.microsoft.com/office/drawing/2010/main" val="0"/>
+              </a:ext>
+            </a:extLst>
+          </a:blip>
+          <a:stretch>
+            <a:fillRect/>
+          </a:stretch>
+        </p:blipFill>
+        <p:spPr>
+          <a:xfrm>
+            <a:off x="352562" y="91864"/>
+            <a:ext cx="3646714" cy="3646714"/>
+          </a:xfrm>
+          <a:prstGeom prst="rect">
+            <a:avLst/>
+          </a:prstGeom>
+        </p:spPr>
+      </p:pic>
+      <p:pic>
+        <p:nvPicPr>
+          <p:cNvPr id="3" name="Image 2">
+            <a:extLst>
+              <a:ext uri="{FF2B5EF4-FFF2-40B4-BE49-F238E27FC236}">
+                <a16:creationId xmlns:a16="http://schemas.microsoft.com/office/drawing/2014/main" id="{33781ED0-36CF-4C9F-8C41-C619AC94E1A0}"/>
+              </a:ext>
+            </a:extLst>
+          </p:cNvPr>
+          <p:cNvPicPr>
+            <a:picLocks noChangeAspect="1"/>
+          </p:cNvPicPr>
+          <p:nvPr/>
+        </p:nvPicPr>
+        <p:blipFill>
+          <a:blip r:embed="rId3">
+            <a:extLst>
+              <a:ext uri="{28A0092B-C50C-407E-A947-70E740481C1C}">
+                <a14:useLocalDpi xmlns:a14="http://schemas.microsoft.com/office/drawing/2010/main" val="0"/>
+              </a:ext>
+            </a:extLst>
+          </a:blip>
+          <a:stretch>
+            <a:fillRect/>
+          </a:stretch>
+        </p:blipFill>
+        <p:spPr>
+          <a:xfrm>
+            <a:off x="2175919" y="2085341"/>
+            <a:ext cx="1599000" cy="1199250"/>
+          </a:xfrm>
+          <a:prstGeom prst="rect">
+            <a:avLst/>
+          </a:prstGeom>
+        </p:spPr>
+      </p:pic>
+      <p:pic>
+        <p:nvPicPr>
+          <p:cNvPr id="6" name="Image 5">
+            <a:extLst>
+              <a:ext uri="{FF2B5EF4-FFF2-40B4-BE49-F238E27FC236}">
+                <a16:creationId xmlns:a16="http://schemas.microsoft.com/office/drawing/2014/main" id="{E974D7EC-A64E-4C62-8F1F-EABAAECAFA4C}"/>
+              </a:ext>
+            </a:extLst>
+          </p:cNvPr>
+          <p:cNvPicPr>
+            <a:picLocks noChangeAspect="1"/>
+          </p:cNvPicPr>
+          <p:nvPr/>
+        </p:nvPicPr>
+        <p:blipFill>
+          <a:blip r:embed="rId4">
+            <a:extLst>
+              <a:ext uri="{28A0092B-C50C-407E-A947-70E740481C1C}">
+                <a14:useLocalDpi xmlns:a14="http://schemas.microsoft.com/office/drawing/2010/main" val="0"/>
+              </a:ext>
+            </a:extLst>
+          </a:blip>
+          <a:stretch>
+            <a:fillRect/>
+          </a:stretch>
+        </p:blipFill>
+        <p:spPr>
+          <a:xfrm>
+            <a:off x="7372880" y="2085341"/>
+            <a:ext cx="1281131" cy="1155154"/>
+          </a:xfrm>
+          <a:prstGeom prst="rect">
+            <a:avLst/>
+          </a:prstGeom>
+        </p:spPr>
+      </p:pic>
+      <p:pic>
+        <p:nvPicPr>
+          <p:cNvPr id="15" name="Image 14">
+            <a:extLst>
+              <a:ext uri="{FF2B5EF4-FFF2-40B4-BE49-F238E27FC236}">
+                <a16:creationId xmlns:a16="http://schemas.microsoft.com/office/drawing/2014/main" id="{AB124F7F-79D1-4521-97DD-54C74B19B8D4}"/>
+              </a:ext>
+            </a:extLst>
+          </p:cNvPr>
+          <p:cNvPicPr>
+            <a:picLocks noChangeAspect="1"/>
+          </p:cNvPicPr>
+          <p:nvPr/>
+        </p:nvPicPr>
+        <p:blipFill>
+          <a:blip r:embed="rId2">
+            <a:extLst>
+              <a:ext uri="{28A0092B-C50C-407E-A947-70E740481C1C}">
+                <a14:useLocalDpi xmlns:a14="http://schemas.microsoft.com/office/drawing/2010/main" val="0"/>
+              </a:ext>
+            </a:extLst>
+          </a:blip>
+          <a:stretch>
+            <a:fillRect/>
+          </a:stretch>
+        </p:blipFill>
+        <p:spPr>
+          <a:xfrm>
+            <a:off x="296527" y="3265555"/>
+            <a:ext cx="3646714" cy="3646714"/>
+          </a:xfrm>
+          <a:prstGeom prst="rect">
+            <a:avLst/>
+          </a:prstGeom>
+        </p:spPr>
+      </p:pic>
+      <p:pic>
+        <p:nvPicPr>
+          <p:cNvPr id="11" name="Image 10">
+            <a:extLst>
+              <a:ext uri="{FF2B5EF4-FFF2-40B4-BE49-F238E27FC236}">
+                <a16:creationId xmlns:a16="http://schemas.microsoft.com/office/drawing/2014/main" id="{5FC23C24-4E8D-47CC-9FD5-FD62E3743CEC}"/>
+              </a:ext>
+            </a:extLst>
+          </p:cNvPr>
+          <p:cNvPicPr>
+            <a:picLocks noChangeAspect="1"/>
+          </p:cNvPicPr>
+          <p:nvPr/>
+        </p:nvPicPr>
+        <p:blipFill>
+          <a:blip r:embed="rId5">
+            <a:extLst>
+              <a:ext uri="{28A0092B-C50C-407E-A947-70E740481C1C}">
+                <a14:useLocalDpi xmlns:a14="http://schemas.microsoft.com/office/drawing/2010/main" val="0"/>
+              </a:ext>
+            </a:extLst>
+          </a:blip>
+          <a:stretch>
+            <a:fillRect/>
+          </a:stretch>
+        </p:blipFill>
+        <p:spPr>
+          <a:xfrm>
+            <a:off x="2019504" y="4998156"/>
+            <a:ext cx="1387432" cy="1387432"/>
+          </a:xfrm>
+          <a:prstGeom prst="rect">
+            <a:avLst/>
+          </a:prstGeom>
+        </p:spPr>
+      </p:pic>
+      <p:pic>
+        <p:nvPicPr>
+          <p:cNvPr id="17" name="Image 16">
+            <a:extLst>
+              <a:ext uri="{FF2B5EF4-FFF2-40B4-BE49-F238E27FC236}">
+                <a16:creationId xmlns:a16="http://schemas.microsoft.com/office/drawing/2014/main" id="{C6BBBFE9-BD27-4A74-AAB9-4C3A1BE7EB71}"/>
+              </a:ext>
+            </a:extLst>
+          </p:cNvPr>
+          <p:cNvPicPr>
+            <a:picLocks noChangeAspect="1"/>
+          </p:cNvPicPr>
+          <p:nvPr/>
+        </p:nvPicPr>
+        <p:blipFill>
+          <a:blip r:embed="rId2">
+            <a:extLst>
+              <a:ext uri="{28A0092B-C50C-407E-A947-70E740481C1C}">
+                <a14:useLocalDpi xmlns:a14="http://schemas.microsoft.com/office/drawing/2010/main" val="0"/>
+              </a:ext>
+            </a:extLst>
+          </a:blip>
+          <a:stretch>
+            <a:fillRect/>
+          </a:stretch>
+        </p:blipFill>
+        <p:spPr>
+          <a:xfrm>
+            <a:off x="4055311" y="3153824"/>
+            <a:ext cx="3646714" cy="3646714"/>
+          </a:xfrm>
+          <a:prstGeom prst="rect">
+            <a:avLst/>
+          </a:prstGeom>
+        </p:spPr>
+      </p:pic>
+      <p:pic>
+        <p:nvPicPr>
+          <p:cNvPr id="19" name="Image 18">
+            <a:extLst>
+              <a:ext uri="{FF2B5EF4-FFF2-40B4-BE49-F238E27FC236}">
+                <a16:creationId xmlns:a16="http://schemas.microsoft.com/office/drawing/2014/main" id="{F7DA2B2B-FB66-4635-BC2A-F3A105AB74FC}"/>
+              </a:ext>
+            </a:extLst>
+          </p:cNvPr>
+          <p:cNvPicPr>
+            <a:picLocks noChangeAspect="1"/>
+          </p:cNvPicPr>
+          <p:nvPr/>
+        </p:nvPicPr>
+        <p:blipFill>
+          <a:blip r:embed="rId6">
+            <a:extLst>
+              <a:ext uri="{28A0092B-C50C-407E-A947-70E740481C1C}">
+                <a14:useLocalDpi xmlns:a14="http://schemas.microsoft.com/office/drawing/2010/main" val="0"/>
+              </a:ext>
+            </a:extLst>
+          </a:blip>
+          <a:stretch>
+            <a:fillRect/>
+          </a:stretch>
+        </p:blipFill>
+        <p:spPr>
+          <a:xfrm>
+            <a:off x="5824580" y="4998156"/>
+            <a:ext cx="1294456" cy="1294456"/>
+          </a:xfrm>
+          <a:prstGeom prst="rect">
+            <a:avLst/>
+          </a:prstGeom>
+        </p:spPr>
+      </p:pic>
+      <p:pic>
+        <p:nvPicPr>
+          <p:cNvPr id="20" name="Image 19">
+            <a:extLst>
+              <a:ext uri="{FF2B5EF4-FFF2-40B4-BE49-F238E27FC236}">
+                <a16:creationId xmlns:a16="http://schemas.microsoft.com/office/drawing/2014/main" id="{F5D8B23B-216B-4F1D-B833-9E0B5CCF6430}"/>
+              </a:ext>
+            </a:extLst>
+          </p:cNvPr>
+          <p:cNvPicPr>
+            <a:picLocks noChangeAspect="1"/>
+          </p:cNvPicPr>
+          <p:nvPr/>
+        </p:nvPicPr>
+        <p:blipFill>
+          <a:blip r:embed="rId2">
+            <a:extLst>
+              <a:ext uri="{28A0092B-C50C-407E-A947-70E740481C1C}">
+                <a14:useLocalDpi xmlns:a14="http://schemas.microsoft.com/office/drawing/2010/main" val="0"/>
+              </a:ext>
+            </a:extLst>
+          </a:blip>
+          <a:stretch>
+            <a:fillRect/>
+          </a:stretch>
+        </p:blipFill>
+        <p:spPr>
+          <a:xfrm>
+            <a:off x="8013445" y="3033823"/>
+            <a:ext cx="3646714" cy="3646714"/>
+          </a:xfrm>
+          <a:prstGeom prst="rect">
+            <a:avLst/>
+          </a:prstGeom>
+        </p:spPr>
+      </p:pic>
+      <p:pic>
+        <p:nvPicPr>
+          <p:cNvPr id="22" name="Image 21">
+            <a:extLst>
+              <a:ext uri="{FF2B5EF4-FFF2-40B4-BE49-F238E27FC236}">
+                <a16:creationId xmlns:a16="http://schemas.microsoft.com/office/drawing/2014/main" id="{E38B995C-D864-4FA0-B50A-79A0B55820FD}"/>
+              </a:ext>
+            </a:extLst>
+          </p:cNvPr>
+          <p:cNvPicPr>
+            <a:picLocks noChangeAspect="1"/>
+          </p:cNvPicPr>
+          <p:nvPr/>
+        </p:nvPicPr>
+        <p:blipFill>
+          <a:blip r:embed="rId7">
+            <a:extLst>
+              <a:ext uri="{28A0092B-C50C-407E-A947-70E740481C1C}">
+                <a14:useLocalDpi xmlns:a14="http://schemas.microsoft.com/office/drawing/2010/main" val="0"/>
+              </a:ext>
+            </a:extLst>
+          </a:blip>
+          <a:stretch>
+            <a:fillRect/>
+          </a:stretch>
+        </p:blipFill>
+        <p:spPr>
+          <a:xfrm>
+            <a:off x="10690449" y="91864"/>
+            <a:ext cx="1269841" cy="1269841"/>
+          </a:xfrm>
+          <a:prstGeom prst="rect">
+            <a:avLst/>
+          </a:prstGeom>
+        </p:spPr>
+      </p:pic>
+      <p:pic>
+        <p:nvPicPr>
+          <p:cNvPr id="24" name="Image 23">
+            <a:extLst>
+              <a:ext uri="{FF2B5EF4-FFF2-40B4-BE49-F238E27FC236}">
+                <a16:creationId xmlns:a16="http://schemas.microsoft.com/office/drawing/2014/main" id="{60CD9D4C-352D-4CED-8BE4-6A1C68DA6986}"/>
+              </a:ext>
+            </a:extLst>
+          </p:cNvPr>
+          <p:cNvPicPr>
+            <a:picLocks noChangeAspect="1"/>
+          </p:cNvPicPr>
+          <p:nvPr/>
+        </p:nvPicPr>
+        <p:blipFill>
+          <a:blip r:embed="rId8">
+            <a:extLst>
+              <a:ext uri="{28A0092B-C50C-407E-A947-70E740481C1C}">
+                <a14:useLocalDpi xmlns:a14="http://schemas.microsoft.com/office/drawing/2010/main" val="0"/>
+              </a:ext>
+            </a:extLst>
+          </a:blip>
+          <a:stretch>
+            <a:fillRect/>
+          </a:stretch>
+        </p:blipFill>
+        <p:spPr>
+          <a:xfrm>
+            <a:off x="9578162" y="4728547"/>
+            <a:ext cx="1564065" cy="1564065"/>
+          </a:xfrm>
+          <a:prstGeom prst="rect">
+            <a:avLst/>
+          </a:prstGeom>
+        </p:spPr>
+      </p:pic>
+      <p:sp>
+        <p:nvSpPr>
+          <p:cNvPr id="28" name="Rectangle 27">
+            <a:extLst>
+              <a:ext uri="{FF2B5EF4-FFF2-40B4-BE49-F238E27FC236}">
+                <a16:creationId xmlns:a16="http://schemas.microsoft.com/office/drawing/2014/main" id="{6F816FDF-6FD8-48C5-BD8C-FEAB9AD95B97}"/>
+              </a:ext>
+            </a:extLst>
+          </p:cNvPr>
+          <p:cNvSpPr/>
+          <p:nvPr/>
+        </p:nvSpPr>
+        <p:spPr>
+          <a:xfrm>
+            <a:off x="4567269" y="3724062"/>
+            <a:ext cx="2664000" cy="2664000"/>
+          </a:xfrm>
+          <a:prstGeom prst="rect">
+            <a:avLst/>
+          </a:prstGeom>
+          <a:noFill/>
+        </p:spPr>
+        <p:style>
+          <a:lnRef idx="2">
+            <a:schemeClr val="accent1">
+              <a:shade val="50000"/>
+            </a:schemeClr>
+          </a:lnRef>
+          <a:fillRef idx="1">
+            <a:schemeClr val="accent1"/>
+          </a:fillRef>
+          <a:effectRef idx="0">
+            <a:schemeClr val="accent1"/>
+          </a:effectRef>
+          <a:fontRef idx="minor">
+            <a:schemeClr val="lt1"/>
+          </a:fontRef>
+        </p:style>
+        <p:txBody>
+          <a:bodyPr rtlCol="0" anchor="ctr"/>
+          <a:lstStyle/>
+          <a:p>
+            <a:pPr algn="ctr"/>
+            <a:endParaRPr lang="fr-FR"/>
+          </a:p>
+        </p:txBody>
+      </p:sp>
+    </p:spTree>
+    <p:extLst>
+      <p:ext uri="{BB962C8B-B14F-4D97-AF65-F5344CB8AC3E}">
+        <p14:creationId xmlns:p14="http://schemas.microsoft.com/office/powerpoint/2010/main" val="1346175183"/>
+      </p:ext>
+    </p:extLst>
+  </p:cSld>
+  <p:clrMapOvr>
+    <a:masterClrMapping/>
+  </p:clrMapOvr>
+</p:sld>
+</file>
+
+<file path=ppt/slides/slide5.xml><?xml version="1.0" encoding="utf-8"?>
+<p:sld xmlns:a="http://schemas.openxmlformats.org/drawingml/2006/main" xmlns:r="http://schemas.openxmlformats.org/officeDocument/2006/relationships" xmlns:p="http://schemas.openxmlformats.org/presentationml/2006/main">
+  <p:cSld>
+    <p:spTree>
+      <p:nvGrpSpPr>
+        <p:cNvPr id="1" name=""/>
+        <p:cNvGrpSpPr/>
+        <p:nvPr/>
+      </p:nvGrpSpPr>
+      <p:grpSpPr>
+        <a:xfrm>
+          <a:off x="0" y="0"/>
+          <a:ext cx="0" cy="0"/>
+          <a:chOff x="0" y="0"/>
+          <a:chExt cx="0" cy="0"/>
+        </a:xfrm>
+      </p:grpSpPr>
+      <p:pic>
+        <p:nvPicPr>
+          <p:cNvPr id="18" name="Image 17">
+            <a:extLst>
+              <a:ext uri="{FF2B5EF4-FFF2-40B4-BE49-F238E27FC236}">
+                <a16:creationId xmlns:a16="http://schemas.microsoft.com/office/drawing/2014/main" id="{43084D84-B1D0-4117-B9F9-F3DB60FB20BC}"/>
+              </a:ext>
+            </a:extLst>
+          </p:cNvPr>
+          <p:cNvPicPr>
+            <a:picLocks noChangeAspect="1"/>
+          </p:cNvPicPr>
+          <p:nvPr/>
+        </p:nvPicPr>
+        <p:blipFill>
+          <a:blip r:embed="rId2">
+            <a:extLst>
+              <a:ext uri="{28A0092B-C50C-407E-A947-70E740481C1C}">
+                <a14:useLocalDpi xmlns:a14="http://schemas.microsoft.com/office/drawing/2010/main" val="0"/>
+              </a:ext>
+            </a:extLst>
+          </a:blip>
+          <a:stretch>
+            <a:fillRect/>
+          </a:stretch>
+        </p:blipFill>
+        <p:spPr>
+          <a:xfrm>
+            <a:off x="4613705" y="380995"/>
+            <a:ext cx="3646714" cy="3646714"/>
+          </a:xfrm>
+          <a:prstGeom prst="rect">
+            <a:avLst/>
+          </a:prstGeom>
+        </p:spPr>
+      </p:pic>
+      <p:pic>
+        <p:nvPicPr>
+          <p:cNvPr id="17" name="Image 16">
+            <a:extLst>
+              <a:ext uri="{FF2B5EF4-FFF2-40B4-BE49-F238E27FC236}">
+                <a16:creationId xmlns:a16="http://schemas.microsoft.com/office/drawing/2014/main" id="{C6BBBFE9-BD27-4A74-AAB9-4C3A1BE7EB71}"/>
+              </a:ext>
+            </a:extLst>
+          </p:cNvPr>
+          <p:cNvPicPr>
+            <a:picLocks noChangeAspect="1"/>
+          </p:cNvPicPr>
+          <p:nvPr/>
+        </p:nvPicPr>
+        <p:blipFill>
+          <a:blip r:embed="rId2">
+            <a:extLst>
+              <a:ext uri="{28A0092B-C50C-407E-A947-70E740481C1C}">
+                <a14:useLocalDpi xmlns:a14="http://schemas.microsoft.com/office/drawing/2010/main" val="0"/>
+              </a:ext>
+            </a:extLst>
+          </a:blip>
+          <a:stretch>
+            <a:fillRect/>
+          </a:stretch>
+        </p:blipFill>
+        <p:spPr>
+          <a:xfrm>
+            <a:off x="213407" y="439354"/>
+            <a:ext cx="3646714" cy="3646714"/>
+          </a:xfrm>
+          <a:prstGeom prst="rect">
+            <a:avLst/>
+          </a:prstGeom>
+        </p:spPr>
+      </p:pic>
+      <p:sp>
+        <p:nvSpPr>
+          <p:cNvPr id="28" name="Rectangle 27">
+            <a:extLst>
+              <a:ext uri="{FF2B5EF4-FFF2-40B4-BE49-F238E27FC236}">
+                <a16:creationId xmlns:a16="http://schemas.microsoft.com/office/drawing/2014/main" id="{6F816FDF-6FD8-48C5-BD8C-FEAB9AD95B97}"/>
+              </a:ext>
+            </a:extLst>
+          </p:cNvPr>
+          <p:cNvSpPr/>
+          <p:nvPr/>
+        </p:nvSpPr>
+        <p:spPr>
+          <a:xfrm>
+            <a:off x="725365" y="1020225"/>
+            <a:ext cx="2664000" cy="2664000"/>
+          </a:xfrm>
+          <a:prstGeom prst="rect">
+            <a:avLst/>
+          </a:prstGeom>
+          <a:noFill/>
+        </p:spPr>
+        <p:style>
+          <a:lnRef idx="2">
+            <a:schemeClr val="accent1">
+              <a:shade val="50000"/>
+            </a:schemeClr>
+          </a:lnRef>
+          <a:fillRef idx="1">
+            <a:schemeClr val="accent1"/>
+          </a:fillRef>
+          <a:effectRef idx="0">
+            <a:schemeClr val="accent1"/>
+          </a:effectRef>
+          <a:fontRef idx="minor">
+            <a:schemeClr val="lt1"/>
+          </a:fontRef>
+        </p:style>
+        <p:txBody>
+          <a:bodyPr rtlCol="0" anchor="ctr"/>
+          <a:lstStyle/>
+          <a:p>
+            <a:pPr algn="ctr"/>
+            <a:endParaRPr lang="fr-FR"/>
+          </a:p>
+        </p:txBody>
+      </p:sp>
+      <p:pic>
+        <p:nvPicPr>
+          <p:cNvPr id="4" name="Image 3">
+            <a:extLst>
+              <a:ext uri="{FF2B5EF4-FFF2-40B4-BE49-F238E27FC236}">
+                <a16:creationId xmlns:a16="http://schemas.microsoft.com/office/drawing/2014/main" id="{013456DC-8382-4B6A-9F3F-AE50BC3533C5}"/>
+              </a:ext>
+            </a:extLst>
+          </p:cNvPr>
+          <p:cNvPicPr>
+            <a:picLocks noChangeAspect="1"/>
+          </p:cNvPicPr>
+          <p:nvPr/>
+        </p:nvPicPr>
+        <p:blipFill>
+          <a:blip r:embed="rId3">
+            <a:extLst>
+              <a:ext uri="{28A0092B-C50C-407E-A947-70E740481C1C}">
+                <a14:useLocalDpi xmlns:a14="http://schemas.microsoft.com/office/drawing/2010/main" val="0"/>
+              </a:ext>
+            </a:extLst>
+          </a:blip>
+          <a:stretch>
+            <a:fillRect/>
+          </a:stretch>
+        </p:blipFill>
+        <p:spPr>
+          <a:xfrm>
+            <a:off x="6616201" y="2291572"/>
+            <a:ext cx="1021581" cy="1323661"/>
+          </a:xfrm>
+          <a:prstGeom prst="rect">
+            <a:avLst/>
+          </a:prstGeom>
+        </p:spPr>
+      </p:pic>
+      <p:pic>
+        <p:nvPicPr>
+          <p:cNvPr id="7" name="Image 6">
+            <a:extLst>
+              <a:ext uri="{FF2B5EF4-FFF2-40B4-BE49-F238E27FC236}">
+                <a16:creationId xmlns:a16="http://schemas.microsoft.com/office/drawing/2014/main" id="{9B141743-14F6-4479-A189-A58B64814193}"/>
+              </a:ext>
+            </a:extLst>
+          </p:cNvPr>
+          <p:cNvPicPr>
+            <a:picLocks noChangeAspect="1"/>
+          </p:cNvPicPr>
+          <p:nvPr/>
+        </p:nvPicPr>
+        <p:blipFill>
+          <a:blip r:embed="rId4">
+            <a:extLst>
+              <a:ext uri="{28A0092B-C50C-407E-A947-70E740481C1C}">
+                <a14:useLocalDpi xmlns:a14="http://schemas.microsoft.com/office/drawing/2010/main" val="0"/>
+              </a:ext>
+            </a:extLst>
+          </a:blip>
+          <a:stretch>
+            <a:fillRect/>
+          </a:stretch>
+        </p:blipFill>
+        <p:spPr>
+          <a:xfrm>
+            <a:off x="1931978" y="2291572"/>
+            <a:ext cx="1371197" cy="1371197"/>
+          </a:xfrm>
+          <a:prstGeom prst="rect">
+            <a:avLst/>
+          </a:prstGeom>
+        </p:spPr>
+      </p:pic>
+      <p:sp>
+        <p:nvSpPr>
+          <p:cNvPr id="21" name="Rectangle 20">
+            <a:extLst>
+              <a:ext uri="{FF2B5EF4-FFF2-40B4-BE49-F238E27FC236}">
+                <a16:creationId xmlns:a16="http://schemas.microsoft.com/office/drawing/2014/main" id="{DA5C6D22-45F9-4F2D-9F45-E4DF9B556072}"/>
+              </a:ext>
+            </a:extLst>
+          </p:cNvPr>
+          <p:cNvSpPr/>
+          <p:nvPr/>
+        </p:nvSpPr>
+        <p:spPr>
+          <a:xfrm>
+            <a:off x="5125663" y="951233"/>
+            <a:ext cx="2664000" cy="2664000"/>
+          </a:xfrm>
+          <a:prstGeom prst="rect">
+            <a:avLst/>
+          </a:prstGeom>
+          <a:noFill/>
+        </p:spPr>
+        <p:style>
+          <a:lnRef idx="2">
+            <a:schemeClr val="accent1">
+              <a:shade val="50000"/>
+            </a:schemeClr>
+          </a:lnRef>
+          <a:fillRef idx="1">
+            <a:schemeClr val="accent1"/>
+          </a:fillRef>
+          <a:effectRef idx="0">
+            <a:schemeClr val="accent1"/>
+          </a:effectRef>
+          <a:fontRef idx="minor">
+            <a:schemeClr val="lt1"/>
+          </a:fontRef>
+        </p:style>
+        <p:txBody>
+          <a:bodyPr rtlCol="0" anchor="ctr"/>
+          <a:lstStyle/>
+          <a:p>
+            <a:pPr algn="ctr"/>
+            <a:endParaRPr lang="fr-FR"/>
+          </a:p>
+        </p:txBody>
+      </p:sp>
+      <p:pic>
+        <p:nvPicPr>
+          <p:cNvPr id="25" name="Image 24">
+            <a:extLst>
+              <a:ext uri="{FF2B5EF4-FFF2-40B4-BE49-F238E27FC236}">
+                <a16:creationId xmlns:a16="http://schemas.microsoft.com/office/drawing/2014/main" id="{8288545C-1664-4B43-8B18-8C2F5CBC988F}"/>
+              </a:ext>
+            </a:extLst>
+          </p:cNvPr>
+          <p:cNvPicPr>
+            <a:picLocks noChangeAspect="1"/>
+          </p:cNvPicPr>
+          <p:nvPr/>
+        </p:nvPicPr>
+        <p:blipFill>
+          <a:blip r:embed="rId2">
+            <a:extLst>
+              <a:ext uri="{28A0092B-C50C-407E-A947-70E740481C1C}">
+                <a14:useLocalDpi xmlns:a14="http://schemas.microsoft.com/office/drawing/2010/main" val="0"/>
+              </a:ext>
+            </a:extLst>
+          </a:blip>
+          <a:stretch>
+            <a:fillRect/>
+          </a:stretch>
+        </p:blipFill>
+        <p:spPr>
+          <a:xfrm>
+            <a:off x="7965884" y="2666994"/>
+            <a:ext cx="3646714" cy="3646714"/>
+          </a:xfrm>
+          <a:prstGeom prst="rect">
+            <a:avLst/>
+          </a:prstGeom>
+        </p:spPr>
+      </p:pic>
+      <p:pic>
+        <p:nvPicPr>
+          <p:cNvPr id="26" name="Image 25">
+            <a:extLst>
+              <a:ext uri="{FF2B5EF4-FFF2-40B4-BE49-F238E27FC236}">
+                <a16:creationId xmlns:a16="http://schemas.microsoft.com/office/drawing/2014/main" id="{B1EE590B-894E-492E-9D02-0430CF0AB675}"/>
+              </a:ext>
+            </a:extLst>
+          </p:cNvPr>
+          <p:cNvPicPr>
+            <a:picLocks noChangeAspect="1"/>
+          </p:cNvPicPr>
+          <p:nvPr/>
+        </p:nvPicPr>
+        <p:blipFill>
+          <a:blip r:embed="rId3">
+            <a:extLst>
+              <a:ext uri="{28A0092B-C50C-407E-A947-70E740481C1C}">
+                <a14:useLocalDpi xmlns:a14="http://schemas.microsoft.com/office/drawing/2010/main" val="0"/>
+              </a:ext>
+            </a:extLst>
+          </a:blip>
+          <a:stretch>
+            <a:fillRect/>
+          </a:stretch>
+        </p:blipFill>
+        <p:spPr>
+          <a:xfrm>
+            <a:off x="9718159" y="4557849"/>
+            <a:ext cx="1318436" cy="1708296"/>
+          </a:xfrm>
+          <a:prstGeom prst="rect">
+            <a:avLst/>
+          </a:prstGeom>
+        </p:spPr>
+      </p:pic>
+      <p:sp>
+        <p:nvSpPr>
+          <p:cNvPr id="27" name="Rectangle 26">
+            <a:extLst>
+              <a:ext uri="{FF2B5EF4-FFF2-40B4-BE49-F238E27FC236}">
+                <a16:creationId xmlns:a16="http://schemas.microsoft.com/office/drawing/2014/main" id="{A5AB5D0F-C15A-47C8-838D-CC88FDB07200}"/>
+              </a:ext>
+            </a:extLst>
+          </p:cNvPr>
+          <p:cNvSpPr/>
+          <p:nvPr/>
+        </p:nvSpPr>
+        <p:spPr>
+          <a:xfrm>
+            <a:off x="8477842" y="3237232"/>
+            <a:ext cx="2664000" cy="2664000"/>
+          </a:xfrm>
+          <a:prstGeom prst="rect">
+            <a:avLst/>
+          </a:prstGeom>
+          <a:noFill/>
+        </p:spPr>
+        <p:style>
+          <a:lnRef idx="2">
+            <a:schemeClr val="accent1">
+              <a:shade val="50000"/>
+            </a:schemeClr>
+          </a:lnRef>
+          <a:fillRef idx="1">
+            <a:schemeClr val="accent1"/>
+          </a:fillRef>
+          <a:effectRef idx="0">
+            <a:schemeClr val="accent1"/>
+          </a:effectRef>
+          <a:fontRef idx="minor">
+            <a:schemeClr val="lt1"/>
+          </a:fontRef>
+        </p:style>
+        <p:txBody>
+          <a:bodyPr rtlCol="0" anchor="ctr"/>
+          <a:lstStyle/>
+          <a:p>
+            <a:pPr algn="ctr"/>
+            <a:endParaRPr lang="fr-FR"/>
+          </a:p>
+        </p:txBody>
+      </p:sp>
+      <p:sp>
+        <p:nvSpPr>
+          <p:cNvPr id="9" name="Rectangle 8">
+            <a:extLst>
+              <a:ext uri="{FF2B5EF4-FFF2-40B4-BE49-F238E27FC236}">
+                <a16:creationId xmlns:a16="http://schemas.microsoft.com/office/drawing/2014/main" id="{E045FF58-BF0C-4FBB-A83E-24EA950E8943}"/>
+              </a:ext>
+            </a:extLst>
+          </p:cNvPr>
+          <p:cNvSpPr/>
+          <p:nvPr/>
+        </p:nvSpPr>
+        <p:spPr>
+          <a:xfrm>
+            <a:off x="9462977" y="5825707"/>
+            <a:ext cx="1573618" cy="563526"/>
+          </a:xfrm>
+          <a:prstGeom prst="rect">
+            <a:avLst/>
+          </a:prstGeom>
+          <a:solidFill>
+            <a:schemeClr val="bg1"/>
+          </a:solidFill>
+          <a:ln>
+            <a:noFill/>
+          </a:ln>
+        </p:spPr>
+        <p:style>
+          <a:lnRef idx="2">
+            <a:schemeClr val="accent1">
+              <a:shade val="50000"/>
+            </a:schemeClr>
+          </a:lnRef>
+          <a:fillRef idx="1">
+            <a:schemeClr val="accent1"/>
+          </a:fillRef>
+          <a:effectRef idx="0">
+            <a:schemeClr val="accent1"/>
+          </a:effectRef>
+          <a:fontRef idx="minor">
+            <a:schemeClr val="lt1"/>
+          </a:fontRef>
+        </p:style>
+        <p:txBody>
+          <a:bodyPr rtlCol="0" anchor="ctr"/>
+          <a:lstStyle/>
+          <a:p>
+            <a:pPr algn="ctr"/>
             <a:endParaRPr lang="fr-FR"/>
           </a:p>
         </p:txBody>
@@ -4482,7 +5237,7 @@
 </p:sld>
 </file>
 
-<file path=ppt/slides/slide4.xml><?xml version="1.0" encoding="utf-8"?>
+<file path=ppt/slides/slide6.xml><?xml version="1.0" encoding="utf-8"?>
 <p:sld xmlns:a="http://schemas.openxmlformats.org/drawingml/2006/main" xmlns:r="http://schemas.openxmlformats.org/officeDocument/2006/relationships" xmlns:p="http://schemas.openxmlformats.org/presentationml/2006/main">
   <p:cSld>
     <p:spTree>

</xml_diff>